<commit_message>
Added final slides to presentation.
</commit_message>
<xml_diff>
--- a/MathematicalModelingOfEpidemology.pptx
+++ b/MathematicalModelingOfEpidemology.pptx
@@ -15,6 +15,9 @@
     <p:sldId id="262" r:id="rId9"/>
     <p:sldId id="263" r:id="rId10"/>
     <p:sldId id="264" r:id="rId11"/>
+    <p:sldId id="266" r:id="rId12"/>
+    <p:sldId id="267" r:id="rId13"/>
+    <p:sldId id="265" r:id="rId14"/>
   </p:sldIdLst>
   <p:sldSz cx="12192000" cy="6858000"/>
   <p:notesSz cx="6858000" cy="9144000"/>
@@ -329,7 +332,7 @@
             <a:fld id="{96DFF08F-DC6B-4601-B491-B0F83F6DD2DA}" type="datetimeFigureOut">
               <a:rPr lang="en-US" dirty="0"/>
               <a:pPr/>
-              <a:t>04-Apr-17</a:t>
+              <a:t>05-Apr-17</a:t>
             </a:fld>
             <a:endParaRPr lang="en-US" dirty="0"/>
           </a:p>
@@ -546,7 +549,7 @@
           <a:p>
             <a:fld id="{96DFF08F-DC6B-4601-B491-B0F83F6DD2DA}" type="datetimeFigureOut">
               <a:rPr lang="en-US" dirty="0"/>
-              <a:t>04-Apr-17</a:t>
+              <a:t>05-Apr-17</a:t>
             </a:fld>
             <a:endParaRPr lang="en-US" dirty="0"/>
           </a:p>
@@ -721,7 +724,7 @@
           <a:p>
             <a:fld id="{96DFF08F-DC6B-4601-B491-B0F83F6DD2DA}" type="datetimeFigureOut">
               <a:rPr lang="en-US" dirty="0"/>
-              <a:t>04-Apr-17</a:t>
+              <a:t>05-Apr-17</a:t>
             </a:fld>
             <a:endParaRPr lang="en-US" dirty="0"/>
           </a:p>
@@ -822,7 +825,6 @@
               <a:rPr lang="en-US"/>
               <a:t>Click to edit Master title style</a:t>
             </a:r>
-            <a:endParaRPr lang="en-US"/>
           </a:p>
         </p:txBody>
       </p:sp>
@@ -887,7 +889,6 @@
               <a:rPr lang="en-US"/>
               <a:t>Click to edit Master subtitle style</a:t>
             </a:r>
-            <a:endParaRPr lang="en-US"/>
           </a:p>
         </p:txBody>
       </p:sp>
@@ -909,7 +910,7 @@
             <a:fld id="{96DFF08F-DC6B-4601-B491-B0F83F6DD2DA}" type="datetimeFigureOut">
               <a:rPr lang="en-US" smtClean="0"/>
               <a:pPr/>
-              <a:t>04-Apr-17</a:t>
+              <a:t>05-Apr-17</a:t>
             </a:fld>
             <a:endParaRPr lang="en-US" dirty="0"/>
           </a:p>
@@ -1007,7 +1008,6 @@
               <a:rPr lang="en-US"/>
               <a:t>Click to edit Master title style</a:t>
             </a:r>
-            <a:endParaRPr lang="en-US"/>
           </a:p>
         </p:txBody>
       </p:sp>
@@ -1059,7 +1059,6 @@
               <a:rPr lang="en-US"/>
               <a:t>Fifth level</a:t>
             </a:r>
-            <a:endParaRPr lang="en-US"/>
           </a:p>
         </p:txBody>
       </p:sp>
@@ -1080,7 +1079,7 @@
           <a:p>
             <a:fld id="{96DFF08F-DC6B-4601-B491-B0F83F6DD2DA}" type="datetimeFigureOut">
               <a:rPr lang="en-US" smtClean="0"/>
-              <a:t>04-Apr-17</a:t>
+              <a:t>05-Apr-17</a:t>
             </a:fld>
             <a:endParaRPr lang="en-US" dirty="0"/>
           </a:p>
@@ -1186,7 +1185,6 @@
               <a:rPr lang="en-US"/>
               <a:t>Click to edit Master title style</a:t>
             </a:r>
-            <a:endParaRPr lang="en-US"/>
           </a:p>
         </p:txBody>
       </p:sp>
@@ -1326,7 +1324,7 @@
           <a:p>
             <a:fld id="{96DFF08F-DC6B-4601-B491-B0F83F6DD2DA}" type="datetimeFigureOut">
               <a:rPr lang="en-US" smtClean="0"/>
-              <a:t>04-Apr-17</a:t>
+              <a:t>05-Apr-17</a:t>
             </a:fld>
             <a:endParaRPr lang="en-US" dirty="0"/>
           </a:p>
@@ -1423,7 +1421,6 @@
               <a:rPr lang="en-US"/>
               <a:t>Click to edit Master title style</a:t>
             </a:r>
-            <a:endParaRPr lang="en-US"/>
           </a:p>
         </p:txBody>
       </p:sp>
@@ -1480,7 +1477,6 @@
               <a:rPr lang="en-US"/>
               <a:t>Fifth level</a:t>
             </a:r>
-            <a:endParaRPr lang="en-US"/>
           </a:p>
         </p:txBody>
       </p:sp>
@@ -1537,7 +1533,6 @@
               <a:rPr lang="en-US"/>
               <a:t>Fifth level</a:t>
             </a:r>
-            <a:endParaRPr lang="en-US"/>
           </a:p>
         </p:txBody>
       </p:sp>
@@ -1558,7 +1553,7 @@
           <a:p>
             <a:fld id="{96DFF08F-DC6B-4601-B491-B0F83F6DD2DA}" type="datetimeFigureOut">
               <a:rPr lang="en-US" smtClean="0"/>
-              <a:t>04-Apr-17</a:t>
+              <a:t>05-Apr-17</a:t>
             </a:fld>
             <a:endParaRPr lang="en-US" dirty="0"/>
           </a:p>
@@ -1660,7 +1655,6 @@
               <a:rPr lang="en-US"/>
               <a:t>Click to edit Master title style</a:t>
             </a:r>
-            <a:endParaRPr lang="en-US"/>
           </a:p>
         </p:txBody>
       </p:sp>
@@ -1782,7 +1776,6 @@
               <a:rPr lang="en-US"/>
               <a:t>Fifth level</a:t>
             </a:r>
-            <a:endParaRPr lang="en-US"/>
           </a:p>
         </p:txBody>
       </p:sp>
@@ -1904,7 +1897,6 @@
               <a:rPr lang="en-US"/>
               <a:t>Fifth level</a:t>
             </a:r>
-            <a:endParaRPr lang="en-US"/>
           </a:p>
         </p:txBody>
       </p:sp>
@@ -1925,7 +1917,7 @@
           <a:p>
             <a:fld id="{96DFF08F-DC6B-4601-B491-B0F83F6DD2DA}" type="datetimeFigureOut">
               <a:rPr lang="en-US" smtClean="0"/>
-              <a:t>04-Apr-17</a:t>
+              <a:t>05-Apr-17</a:t>
             </a:fld>
             <a:endParaRPr lang="en-US" dirty="0"/>
           </a:p>
@@ -2022,7 +2014,6 @@
               <a:rPr lang="en-US"/>
               <a:t>Click to edit Master title style</a:t>
             </a:r>
-            <a:endParaRPr lang="en-US"/>
           </a:p>
         </p:txBody>
       </p:sp>
@@ -2043,7 +2034,7 @@
           <a:p>
             <a:fld id="{96DFF08F-DC6B-4601-B491-B0F83F6DD2DA}" type="datetimeFigureOut">
               <a:rPr lang="en-US" smtClean="0"/>
-              <a:t>04-Apr-17</a:t>
+              <a:t>05-Apr-17</a:t>
             </a:fld>
             <a:endParaRPr lang="en-US" dirty="0"/>
           </a:p>
@@ -2138,7 +2129,7 @@
           <a:p>
             <a:fld id="{96DFF08F-DC6B-4601-B491-B0F83F6DD2DA}" type="datetimeFigureOut">
               <a:rPr lang="en-US" smtClean="0"/>
-              <a:t>04-Apr-17</a:t>
+              <a:t>05-Apr-17</a:t>
             </a:fld>
             <a:endParaRPr lang="en-US" dirty="0"/>
           </a:p>
@@ -2244,7 +2235,6 @@
               <a:rPr lang="en-US"/>
               <a:t>Click to edit Master title style</a:t>
             </a:r>
-            <a:endParaRPr lang="en-US"/>
           </a:p>
         </p:txBody>
       </p:sp>
@@ -2329,7 +2319,6 @@
               <a:rPr lang="en-US"/>
               <a:t>Fifth level</a:t>
             </a:r>
-            <a:endParaRPr lang="en-US"/>
           </a:p>
         </p:txBody>
       </p:sp>
@@ -2415,7 +2404,7 @@
           <a:p>
             <a:fld id="{96DFF08F-DC6B-4601-B491-B0F83F6DD2DA}" type="datetimeFigureOut">
               <a:rPr lang="en-US" smtClean="0"/>
-              <a:t>04-Apr-17</a:t>
+              <a:t>05-Apr-17</a:t>
             </a:fld>
             <a:endParaRPr lang="en-US" dirty="0"/>
           </a:p>
@@ -2585,7 +2574,7 @@
           <a:p>
             <a:fld id="{96DFF08F-DC6B-4601-B491-B0F83F6DD2DA}" type="datetimeFigureOut">
               <a:rPr lang="en-US" dirty="0"/>
-              <a:t>04-Apr-17</a:t>
+              <a:t>05-Apr-17</a:t>
             </a:fld>
             <a:endParaRPr lang="en-US" dirty="0"/>
           </a:p>
@@ -2686,7 +2675,6 @@
               <a:rPr lang="en-US"/>
               <a:t>Click to edit Master title style</a:t>
             </a:r>
-            <a:endParaRPr lang="en-US"/>
           </a:p>
         </p:txBody>
       </p:sp>
@@ -2833,7 +2821,7 @@
           <a:p>
             <a:fld id="{96DFF08F-DC6B-4601-B491-B0F83F6DD2DA}" type="datetimeFigureOut">
               <a:rPr lang="en-US" smtClean="0"/>
-              <a:t>04-Apr-17</a:t>
+              <a:t>05-Apr-17</a:t>
             </a:fld>
             <a:endParaRPr lang="en-US" dirty="0"/>
           </a:p>
@@ -2930,7 +2918,6 @@
               <a:rPr lang="en-US"/>
               <a:t>Click to edit Master title style</a:t>
             </a:r>
-            <a:endParaRPr lang="en-US"/>
           </a:p>
         </p:txBody>
       </p:sp>
@@ -2982,7 +2969,6 @@
               <a:rPr lang="en-US"/>
               <a:t>Fifth level</a:t>
             </a:r>
-            <a:endParaRPr lang="en-US"/>
           </a:p>
         </p:txBody>
       </p:sp>
@@ -3003,7 +2989,7 @@
           <a:p>
             <a:fld id="{96DFF08F-DC6B-4601-B491-B0F83F6DD2DA}" type="datetimeFigureOut">
               <a:rPr lang="en-US" smtClean="0"/>
-              <a:t>04-Apr-17</a:t>
+              <a:t>05-Apr-17</a:t>
             </a:fld>
             <a:endParaRPr lang="en-US" dirty="0"/>
           </a:p>
@@ -3105,7 +3091,6 @@
               <a:rPr lang="en-US"/>
               <a:t>Click to edit Master title style</a:t>
             </a:r>
-            <a:endParaRPr lang="en-US"/>
           </a:p>
         </p:txBody>
       </p:sp>
@@ -3162,7 +3147,6 @@
               <a:rPr lang="en-US"/>
               <a:t>Fifth level</a:t>
             </a:r>
-            <a:endParaRPr lang="en-US"/>
           </a:p>
         </p:txBody>
       </p:sp>
@@ -3183,7 +3167,7 @@
           <a:p>
             <a:fld id="{96DFF08F-DC6B-4601-B491-B0F83F6DD2DA}" type="datetimeFigureOut">
               <a:rPr lang="en-US" smtClean="0"/>
-              <a:t>04-Apr-17</a:t>
+              <a:t>05-Apr-17</a:t>
             </a:fld>
             <a:endParaRPr lang="en-US" dirty="0"/>
           </a:p>
@@ -3434,7 +3418,7 @@
           <a:p>
             <a:fld id="{96DFF08F-DC6B-4601-B491-B0F83F6DD2DA}" type="datetimeFigureOut">
               <a:rPr lang="en-US" dirty="0"/>
-              <a:t>04-Apr-17</a:t>
+              <a:t>05-Apr-17</a:t>
             </a:fld>
             <a:endParaRPr lang="en-US" dirty="0"/>
           </a:p>
@@ -3752,7 +3736,7 @@
           <a:p>
             <a:fld id="{96DFF08F-DC6B-4601-B491-B0F83F6DD2DA}" type="datetimeFigureOut">
               <a:rPr lang="en-US" dirty="0"/>
-              <a:t>04-Apr-17</a:t>
+              <a:t>05-Apr-17</a:t>
             </a:fld>
             <a:endParaRPr lang="en-US" dirty="0"/>
           </a:p>
@@ -4171,7 +4155,7 @@
           <a:p>
             <a:fld id="{96DFF08F-DC6B-4601-B491-B0F83F6DD2DA}" type="datetimeFigureOut">
               <a:rPr lang="en-US" dirty="0"/>
-              <a:t>04-Apr-17</a:t>
+              <a:t>05-Apr-17</a:t>
             </a:fld>
             <a:endParaRPr lang="en-US" dirty="0"/>
           </a:p>
@@ -4284,7 +4268,7 @@
           <a:p>
             <a:fld id="{96DFF08F-DC6B-4601-B491-B0F83F6DD2DA}" type="datetimeFigureOut">
               <a:rPr lang="en-US" dirty="0"/>
-              <a:t>04-Apr-17</a:t>
+              <a:t>05-Apr-17</a:t>
             </a:fld>
             <a:endParaRPr lang="en-US" dirty="0"/>
           </a:p>
@@ -4374,7 +4358,7 @@
           <a:p>
             <a:fld id="{96DFF08F-DC6B-4601-B491-B0F83F6DD2DA}" type="datetimeFigureOut">
               <a:rPr lang="en-US" dirty="0"/>
-              <a:t>04-Apr-17</a:t>
+              <a:t>05-Apr-17</a:t>
             </a:fld>
             <a:endParaRPr lang="en-US" dirty="0"/>
           </a:p>
@@ -4659,7 +4643,7 @@
           <a:p>
             <a:fld id="{96DFF08F-DC6B-4601-B491-B0F83F6DD2DA}" type="datetimeFigureOut">
               <a:rPr lang="en-US" dirty="0"/>
-              <a:t>04-Apr-17</a:t>
+              <a:t>05-Apr-17</a:t>
             </a:fld>
             <a:endParaRPr lang="en-US" dirty="0"/>
           </a:p>
@@ -4926,7 +4910,7 @@
           <a:p>
             <a:fld id="{96DFF08F-DC6B-4601-B491-B0F83F6DD2DA}" type="datetimeFigureOut">
               <a:rPr lang="en-US" dirty="0"/>
-              <a:t>04-Apr-17</a:t>
+              <a:t>05-Apr-17</a:t>
             </a:fld>
             <a:endParaRPr lang="en-US" dirty="0"/>
           </a:p>
@@ -5181,7 +5165,7 @@
             <a:fld id="{96DFF08F-DC6B-4601-B491-B0F83F6DD2DA}" type="datetimeFigureOut">
               <a:rPr lang="en-US" dirty="0"/>
               <a:pPr/>
-              <a:t>04-Apr-17</a:t>
+              <a:t>05-Apr-17</a:t>
             </a:fld>
             <a:endParaRPr lang="en-US" dirty="0"/>
           </a:p>
@@ -5672,7 +5656,6 @@
               <a:rPr lang="en-US"/>
               <a:t>Click to edit Master title style</a:t>
             </a:r>
-            <a:endParaRPr lang="en-US"/>
           </a:p>
         </p:txBody>
       </p:sp>
@@ -5734,7 +5717,6 @@
               <a:rPr lang="en-US"/>
               <a:t>Fifth level</a:t>
             </a:r>
-            <a:endParaRPr lang="en-US"/>
           </a:p>
         </p:txBody>
       </p:sp>
@@ -5774,7 +5756,7 @@
             <a:fld id="{96DFF08F-DC6B-4601-B491-B0F83F6DD2DA}" type="datetimeFigureOut">
               <a:rPr lang="en-US" smtClean="0"/>
               <a:pPr/>
-              <a:t>04-Apr-17</a:t>
+              <a:t>05-Apr-17</a:t>
             </a:fld>
             <a:endParaRPr lang="en-US" dirty="0"/>
           </a:p>
@@ -6192,7 +6174,7 @@
         </p:nvSpPr>
         <p:spPr>
           <a:xfrm>
-            <a:off x="228600" y="882376"/>
+            <a:off x="235585" y="825226"/>
             <a:ext cx="11715750" cy="2926080"/>
           </a:xfrm>
         </p:spPr>
@@ -6257,6 +6239,320 @@
     <p:extLst>
       <p:ext uri="{BB962C8B-B14F-4D97-AF65-F5344CB8AC3E}">
         <p14:creationId xmlns:p14="http://schemas.microsoft.com/office/powerpoint/2010/main" val="1923903087"/>
+      </p:ext>
+    </p:extLst>
+  </p:cSld>
+  <p:clrMapOvr>
+    <a:masterClrMapping/>
+  </p:clrMapOvr>
+</p:sld>
+</file>
+
+<file path=ppt/slides/slide10.xml><?xml version="1.0" encoding="utf-8"?>
+<p:sld xmlns:a="http://schemas.openxmlformats.org/drawingml/2006/main" xmlns:r="http://schemas.openxmlformats.org/officeDocument/2006/relationships" xmlns:p="http://schemas.openxmlformats.org/presentationml/2006/main">
+  <p:cSld>
+    <p:bg>
+      <p:bgPr>
+        <a:solidFill>
+          <a:schemeClr val="tx1">
+            <a:lumMod val="85000"/>
+            <a:lumOff val="15000"/>
+          </a:schemeClr>
+        </a:solidFill>
+        <a:effectLst/>
+      </p:bgPr>
+    </p:bg>
+    <p:spTree>
+      <p:nvGrpSpPr>
+        <p:cNvPr id="1" name=""/>
+        <p:cNvGrpSpPr/>
+        <p:nvPr/>
+      </p:nvGrpSpPr>
+      <p:grpSpPr>
+        <a:xfrm>
+          <a:off x="0" y="0"/>
+          <a:ext cx="0" cy="0"/>
+          <a:chOff x="0" y="0"/>
+          <a:chExt cx="0" cy="0"/>
+        </a:xfrm>
+      </p:grpSpPr>
+      <p:sp>
+        <p:nvSpPr>
+          <p:cNvPr id="2" name="Title 1"/>
+          <p:cNvSpPr>
+            <a:spLocks noGrp="1"/>
+          </p:cNvSpPr>
+          <p:nvPr>
+            <p:ph type="title"/>
+          </p:nvPr>
+        </p:nvSpPr>
+        <p:spPr>
+          <a:xfrm>
+            <a:off x="838200" y="2766218"/>
+            <a:ext cx="10515600" cy="1325563"/>
+          </a:xfrm>
+        </p:spPr>
+        <p:txBody>
+          <a:bodyPr>
+            <a:noAutofit/>
+          </a:bodyPr>
+          <a:lstStyle/>
+          <a:p>
+            <a:pPr algn="ctr"/>
+            <a:r>
+              <a:rPr lang="bg-BG" sz="6600" dirty="0">
+                <a:solidFill>
+                  <a:schemeClr val="bg1"/>
+                </a:solidFill>
+                <a:latin typeface="Trebuchet MS" panose="020B0603020202020204" pitchFamily="34" charset="0"/>
+              </a:rPr>
+              <a:t>Демо</a:t>
+            </a:r>
+            <a:endParaRPr lang="en-US" sz="6600" dirty="0">
+              <a:solidFill>
+                <a:schemeClr val="bg1"/>
+              </a:solidFill>
+              <a:latin typeface="Trebuchet MS" panose="020B0603020202020204" pitchFamily="34" charset="0"/>
+            </a:endParaRPr>
+          </a:p>
+        </p:txBody>
+      </p:sp>
+    </p:spTree>
+    <p:extLst>
+      <p:ext uri="{BB962C8B-B14F-4D97-AF65-F5344CB8AC3E}">
+        <p14:creationId xmlns:p14="http://schemas.microsoft.com/office/powerpoint/2010/main" val="1605103204"/>
+      </p:ext>
+    </p:extLst>
+  </p:cSld>
+  <p:clrMapOvr>
+    <a:masterClrMapping/>
+  </p:clrMapOvr>
+</p:sld>
+</file>
+
+<file path=ppt/slides/slide11.xml><?xml version="1.0" encoding="utf-8"?>
+<p:sld xmlns:a="http://schemas.openxmlformats.org/drawingml/2006/main" xmlns:r="http://schemas.openxmlformats.org/officeDocument/2006/relationships" xmlns:p="http://schemas.openxmlformats.org/presentationml/2006/main">
+  <p:cSld>
+    <p:bg>
+      <p:bgPr>
+        <a:solidFill>
+          <a:schemeClr val="tx1">
+            <a:lumMod val="85000"/>
+            <a:lumOff val="15000"/>
+          </a:schemeClr>
+        </a:solidFill>
+        <a:effectLst/>
+      </p:bgPr>
+    </p:bg>
+    <p:spTree>
+      <p:nvGrpSpPr>
+        <p:cNvPr id="1" name=""/>
+        <p:cNvGrpSpPr/>
+        <p:nvPr/>
+      </p:nvGrpSpPr>
+      <p:grpSpPr>
+        <a:xfrm>
+          <a:off x="0" y="0"/>
+          <a:ext cx="0" cy="0"/>
+          <a:chOff x="0" y="0"/>
+          <a:chExt cx="0" cy="0"/>
+        </a:xfrm>
+      </p:grpSpPr>
+      <p:sp>
+        <p:nvSpPr>
+          <p:cNvPr id="2" name="Title 1"/>
+          <p:cNvSpPr>
+            <a:spLocks noGrp="1"/>
+          </p:cNvSpPr>
+          <p:nvPr>
+            <p:ph type="title"/>
+          </p:nvPr>
+        </p:nvSpPr>
+        <p:spPr>
+          <a:xfrm>
+            <a:off x="838200" y="2766218"/>
+            <a:ext cx="10515600" cy="1325563"/>
+          </a:xfrm>
+        </p:spPr>
+        <p:txBody>
+          <a:bodyPr>
+            <a:noAutofit/>
+          </a:bodyPr>
+          <a:lstStyle/>
+          <a:p>
+            <a:pPr algn="ctr"/>
+            <a:r>
+              <a:rPr lang="bg-BG" sz="6600" dirty="0">
+                <a:solidFill>
+                  <a:schemeClr val="bg1"/>
+                </a:solidFill>
+                <a:latin typeface="Trebuchet MS" panose="020B0603020202020204" pitchFamily="34" charset="0"/>
+              </a:rPr>
+              <a:t>Въпроси?</a:t>
+            </a:r>
+            <a:endParaRPr lang="en-US" sz="6600" dirty="0">
+              <a:solidFill>
+                <a:schemeClr val="bg1"/>
+              </a:solidFill>
+              <a:latin typeface="Trebuchet MS" panose="020B0603020202020204" pitchFamily="34" charset="0"/>
+            </a:endParaRPr>
+          </a:p>
+        </p:txBody>
+      </p:sp>
+    </p:spTree>
+    <p:extLst>
+      <p:ext uri="{BB962C8B-B14F-4D97-AF65-F5344CB8AC3E}">
+        <p14:creationId xmlns:p14="http://schemas.microsoft.com/office/powerpoint/2010/main" val="2075095251"/>
+      </p:ext>
+    </p:extLst>
+  </p:cSld>
+  <p:clrMapOvr>
+    <a:masterClrMapping/>
+  </p:clrMapOvr>
+</p:sld>
+</file>
+
+<file path=ppt/slides/slide12.xml><?xml version="1.0" encoding="utf-8"?>
+<p:sld xmlns:a="http://schemas.openxmlformats.org/drawingml/2006/main" xmlns:r="http://schemas.openxmlformats.org/officeDocument/2006/relationships" xmlns:p="http://schemas.openxmlformats.org/presentationml/2006/main">
+  <p:cSld>
+    <p:spTree>
+      <p:nvGrpSpPr>
+        <p:cNvPr id="1" name=""/>
+        <p:cNvGrpSpPr/>
+        <p:nvPr/>
+      </p:nvGrpSpPr>
+      <p:grpSpPr>
+        <a:xfrm>
+          <a:off x="0" y="0"/>
+          <a:ext cx="0" cy="0"/>
+          <a:chOff x="0" y="0"/>
+          <a:chExt cx="0" cy="0"/>
+        </a:xfrm>
+      </p:grpSpPr>
+      <p:sp>
+        <p:nvSpPr>
+          <p:cNvPr id="2" name="Title 1"/>
+          <p:cNvSpPr>
+            <a:spLocks noGrp="1"/>
+          </p:cNvSpPr>
+          <p:nvPr>
+            <p:ph type="title"/>
+          </p:nvPr>
+        </p:nvSpPr>
+        <p:spPr>
+          <a:xfrm>
+            <a:off x="1143000" y="2376854"/>
+            <a:ext cx="5671038" cy="1356360"/>
+          </a:xfrm>
+        </p:spPr>
+        <p:txBody>
+          <a:bodyPr>
+            <a:normAutofit/>
+          </a:bodyPr>
+          <a:lstStyle/>
+          <a:p>
+            <a:r>
+              <a:rPr lang="bg-BG" sz="5400" dirty="0"/>
+              <a:t>Благодаря ви!</a:t>
+            </a:r>
+            <a:endParaRPr lang="en-US" sz="5400" dirty="0"/>
+          </a:p>
+        </p:txBody>
+      </p:sp>
+      <p:sp>
+        <p:nvSpPr>
+          <p:cNvPr id="3" name="Content Placeholder 2"/>
+          <p:cNvSpPr>
+            <a:spLocks noGrp="1"/>
+          </p:cNvSpPr>
+          <p:nvPr>
+            <p:ph idx="1"/>
+          </p:nvPr>
+        </p:nvSpPr>
+        <p:spPr>
+          <a:xfrm>
+            <a:off x="7491047" y="1035734"/>
+            <a:ext cx="3877407" cy="4038600"/>
+          </a:xfrm>
+        </p:spPr>
+        <p:txBody>
+          <a:bodyPr/>
+          <a:lstStyle/>
+          <a:p>
+            <a:pPr marL="45720" indent="0">
+              <a:buNone/>
+            </a:pPr>
+            <a:r>
+              <a:rPr lang="bg-BG" sz="2800" dirty="0"/>
+              <a:t>Контакти </a:t>
+            </a:r>
+          </a:p>
+          <a:p>
+            <a:pPr marL="45720" indent="0">
+              <a:buNone/>
+            </a:pPr>
+            <a:endParaRPr lang="bg-BG" dirty="0"/>
+          </a:p>
+          <a:p>
+            <a:pPr marL="45720" indent="0">
+              <a:buNone/>
+            </a:pPr>
+            <a:r>
+              <a:rPr lang="bg-BG" dirty="0"/>
+              <a:t>Марио Ничев </a:t>
+            </a:r>
+          </a:p>
+          <a:p>
+            <a:pPr marL="45720" indent="0">
+              <a:buNone/>
+            </a:pPr>
+            <a:r>
+              <a:rPr lang="en-US" dirty="0">
+                <a:hlinkClick r:id="rId2"/>
+              </a:rPr>
+              <a:t>mario.nitchev@gmail.com</a:t>
+            </a:r>
+            <a:endParaRPr lang="en-US" dirty="0"/>
+          </a:p>
+          <a:p>
+            <a:pPr marL="45720" indent="0">
+              <a:buNone/>
+            </a:pPr>
+            <a:endParaRPr lang="en-US" dirty="0"/>
+          </a:p>
+          <a:p>
+            <a:pPr marL="45720" indent="0">
+              <a:buNone/>
+            </a:pPr>
+            <a:r>
+              <a:rPr lang="bg-BG" dirty="0"/>
+              <a:t>Божидар Димитров</a:t>
+            </a:r>
+          </a:p>
+          <a:p>
+            <a:pPr marL="45720" indent="0">
+              <a:buNone/>
+            </a:pPr>
+            <a:r>
+              <a:rPr lang="en-US" dirty="0">
+                <a:hlinkClick r:id="rId2"/>
+              </a:rPr>
+              <a:t>bojo1195@gmail.com</a:t>
+            </a:r>
+            <a:endParaRPr lang="en-US" dirty="0"/>
+          </a:p>
+          <a:p>
+            <a:pPr marL="45720" indent="0">
+              <a:buNone/>
+            </a:pPr>
+            <a:endParaRPr lang="en-US" dirty="0"/>
+          </a:p>
+        </p:txBody>
+      </p:sp>
+    </p:spTree>
+    <p:extLst>
+      <p:ext uri="{BB962C8B-B14F-4D97-AF65-F5344CB8AC3E}">
+        <p14:creationId xmlns:p14="http://schemas.microsoft.com/office/powerpoint/2010/main" val="4123437318"/>
       </p:ext>
     </p:extLst>
   </p:cSld>
@@ -6318,13 +6614,13 @@
           <a:p>
             <a:pPr algn="ctr"/>
             <a:r>
-              <a:rPr lang="bg-BG" sz="6600" dirty="0">
+              <a:rPr lang="bg-BG" sz="6600" dirty="0" err="1">
                 <a:solidFill>
                   <a:schemeClr val="bg1"/>
                 </a:solidFill>
                 <a:latin typeface="Trebuchet MS" panose="020B0603020202020204" pitchFamily="34" charset="0"/>
               </a:rPr>
-              <a:t>ЕПИДЕМОЛОГИЯ</a:t>
+              <a:t>Епидемология</a:t>
             </a:r>
             <a:endParaRPr lang="en-US" sz="6600" dirty="0">
               <a:solidFill>
@@ -8620,7 +8916,7 @@
             </p:nvSpPr>
             <p:spPr>
               <a:xfrm>
-                <a:off x="7804226" y="2498290"/>
+                <a:off x="8284837" y="2508926"/>
                 <a:ext cx="3214294" cy="1853048"/>
               </a:xfrm>
               <a:ln>
@@ -8720,6 +9016,18 @@
                           <a:latin typeface="Cambria Math" panose="02040503050406030204" pitchFamily="18" charset="0"/>
                         </a:rPr>
                         <m:t>𝑆</m:t>
+                      </m:r>
+                      <m:r>
+                        <a:rPr lang="en-US" sz="3200" b="0" i="1" smtClean="0">
+                          <a:solidFill>
+                            <a:schemeClr val="tx1">
+                              <a:lumMod val="85000"/>
+                              <a:lumOff val="15000"/>
+                            </a:schemeClr>
+                          </a:solidFill>
+                          <a:latin typeface="Cambria Math" panose="02040503050406030204" pitchFamily="18" charset="0"/>
+                        </a:rPr>
+                        <m:t>𝐼</m:t>
                       </m:r>
                       <m:r>
                         <a:rPr lang="en-US" sz="3200" b="0" i="1" smtClean="0">
@@ -8972,7 +9280,7 @@
             </p:nvSpPr>
             <p:spPr>
               <a:xfrm>
-                <a:off x="7804226" y="2498290"/>
+                <a:off x="8284837" y="2508926"/>
                 <a:ext cx="3214294" cy="1853048"/>
               </a:xfrm>
               <a:blipFill>
@@ -9815,7 +10123,7 @@
         </p:nvCxnSpPr>
         <p:spPr>
           <a:xfrm>
-            <a:off x="8051411" y="2498290"/>
+            <a:off x="8517403" y="2508926"/>
             <a:ext cx="0" cy="1719698"/>
           </a:xfrm>
           <a:prstGeom prst="line">
@@ -9845,8 +10153,8 @@
         </p:nvSpPr>
         <p:spPr>
           <a:xfrm>
-            <a:off x="892980" y="2498289"/>
-            <a:ext cx="7187006" cy="2062103"/>
+            <a:off x="758131" y="2273720"/>
+            <a:ext cx="7587617" cy="2308324"/>
           </a:xfrm>
           <a:prstGeom prst="rect">
             <a:avLst/>
@@ -9860,53 +10168,123 @@
           <a:lstStyle/>
           <a:p>
             <a:r>
-              <a:rPr lang="bg-BG" sz="3200" dirty="0"/>
-              <a:t>Всички стойности са положителни.</a:t>
-            </a:r>
-          </a:p>
-          <a:p>
-            <a:r>
-              <a:rPr lang="el-GR" sz="3200" dirty="0"/>
+              <a:rPr lang="en-US" sz="2400" dirty="0">
+                <a:latin typeface="Trebuchet MS" panose="020B0603020202020204" pitchFamily="34" charset="0"/>
+              </a:rPr>
+              <a:t>N –</a:t>
+            </a:r>
+            <a:r>
+              <a:rPr lang="bg-BG" sz="2400" dirty="0">
+                <a:latin typeface="Trebuchet MS" panose="020B0603020202020204" pitchFamily="34" charset="0"/>
+              </a:rPr>
+              <a:t> общия брой на населението</a:t>
+            </a:r>
+          </a:p>
+          <a:p>
+            <a:r>
+              <a:rPr lang="en-US" sz="2400" dirty="0">
+                <a:latin typeface="Trebuchet MS" panose="020B0603020202020204" pitchFamily="34" charset="0"/>
+              </a:rPr>
+              <a:t>N = S + I + R</a:t>
+            </a:r>
+            <a:endParaRPr lang="bg-BG" sz="2400" dirty="0">
+              <a:latin typeface="Trebuchet MS" panose="020B0603020202020204" pitchFamily="34" charset="0"/>
+            </a:endParaRPr>
+          </a:p>
+          <a:p>
+            <a:r>
+              <a:rPr lang="el-GR" sz="2400" dirty="0">
+                <a:latin typeface="Trebuchet MS" panose="020B0603020202020204" pitchFamily="34" charset="0"/>
+              </a:rPr>
               <a:t>β</a:t>
             </a:r>
             <a:r>
-              <a:rPr lang="en-US" sz="3200" dirty="0"/>
+              <a:rPr lang="en-US" sz="2400" dirty="0">
+                <a:latin typeface="Trebuchet MS" panose="020B0603020202020204" pitchFamily="34" charset="0"/>
+              </a:rPr>
               <a:t> –</a:t>
             </a:r>
             <a:r>
-              <a:rPr lang="bg-BG" sz="3200" dirty="0"/>
+              <a:rPr lang="bg-BG" sz="2400" dirty="0">
+                <a:latin typeface="Trebuchet MS" panose="020B0603020202020204" pitchFamily="34" charset="0"/>
+              </a:rPr>
               <a:t> шанс за предаване на заразата</a:t>
             </a:r>
             <a:r>
-              <a:rPr lang="en-US" sz="3200" dirty="0"/>
+              <a:rPr lang="en-US" sz="2400" dirty="0">
+                <a:latin typeface="Trebuchet MS" panose="020B0603020202020204" pitchFamily="34" charset="0"/>
+              </a:rPr>
               <a:t> </a:t>
             </a:r>
           </a:p>
           <a:p>
             <a:r>
-              <a:rPr lang="el-GR" sz="3200" dirty="0"/>
+              <a:rPr lang="el-GR" sz="2400" dirty="0">
+                <a:latin typeface="Trebuchet MS" panose="020B0603020202020204" pitchFamily="34" charset="0"/>
+              </a:rPr>
               <a:t>α</a:t>
             </a:r>
             <a:r>
-              <a:rPr lang="bg-BG" sz="3200" dirty="0"/>
+              <a:rPr lang="bg-BG" sz="2400" dirty="0">
+                <a:latin typeface="Trebuchet MS" panose="020B0603020202020204" pitchFamily="34" charset="0"/>
+              </a:rPr>
               <a:t> – скорост на преминаване от </a:t>
             </a:r>
             <a:r>
-              <a:rPr lang="en-US" sz="3200" dirty="0"/>
+              <a:rPr lang="en-US" sz="2400" dirty="0">
+                <a:latin typeface="Trebuchet MS" panose="020B0603020202020204" pitchFamily="34" charset="0"/>
+              </a:rPr>
               <a:t>I </a:t>
             </a:r>
             <a:r>
-              <a:rPr lang="bg-BG" sz="3200" dirty="0"/>
+              <a:rPr lang="bg-BG" sz="2400" dirty="0">
+                <a:latin typeface="Trebuchet MS" panose="020B0603020202020204" pitchFamily="34" charset="0"/>
+              </a:rPr>
               <a:t>в </a:t>
             </a:r>
             <a:r>
-              <a:rPr lang="en-US" sz="3200" dirty="0"/>
+              <a:rPr lang="en-US" sz="2400" dirty="0">
+                <a:latin typeface="Trebuchet MS" panose="020B0603020202020204" pitchFamily="34" charset="0"/>
+              </a:rPr>
               <a:t>R</a:t>
             </a:r>
-            <a:endParaRPr lang="bg-BG" sz="3200" dirty="0"/>
-          </a:p>
-          <a:p>
-            <a:endParaRPr lang="en-US" sz="3200" dirty="0"/>
+          </a:p>
+          <a:p>
+            <a:r>
+              <a:rPr lang="bg-BG" sz="2400" dirty="0">
+                <a:latin typeface="Trebuchet MS" panose="020B0603020202020204" pitchFamily="34" charset="0"/>
+              </a:rPr>
+              <a:t>Симулацията приключва, когато </a:t>
+            </a:r>
+            <a:r>
+              <a:rPr lang="en-US" sz="2400" dirty="0">
+                <a:latin typeface="Trebuchet MS" panose="020B0603020202020204" pitchFamily="34" charset="0"/>
+              </a:rPr>
+              <a:t>S </a:t>
+            </a:r>
+            <a:r>
+              <a:rPr lang="bg-BG" sz="2400" dirty="0">
+                <a:latin typeface="Trebuchet MS" panose="020B0603020202020204" pitchFamily="34" charset="0"/>
+              </a:rPr>
+              <a:t>или </a:t>
+            </a:r>
+            <a:r>
+              <a:rPr lang="en-US" sz="2400" dirty="0">
+                <a:latin typeface="Trebuchet MS" panose="020B0603020202020204" pitchFamily="34" charset="0"/>
+              </a:rPr>
+              <a:t>I </a:t>
+            </a:r>
+            <a:r>
+              <a:rPr lang="bg-BG" sz="2400" dirty="0">
+                <a:latin typeface="Trebuchet MS" panose="020B0603020202020204" pitchFamily="34" charset="0"/>
+              </a:rPr>
+              <a:t>достигне 0.</a:t>
+            </a:r>
+          </a:p>
+          <a:p>
+            <a:endParaRPr lang="en-US" sz="2400" dirty="0">
+              <a:latin typeface="Trebuchet MS" panose="020B0603020202020204" pitchFamily="34" charset="0"/>
+            </a:endParaRPr>
           </a:p>
         </p:txBody>
       </p:sp>
@@ -9956,8 +10334,8 @@
         </p:blipFill>
         <p:spPr>
           <a:xfrm>
-            <a:off x="1933576" y="2057400"/>
-            <a:ext cx="8191500" cy="4253269"/>
+            <a:off x="5808932" y="1965960"/>
+            <a:ext cx="6178793" cy="4692884"/>
           </a:xfrm>
           <a:prstGeom prst="rect">
             <a:avLst/>
@@ -9976,24 +10354,7 @@
         </p:nvSpPr>
         <p:spPr>
           <a:ln w="12700">
-            <a:gradFill flip="none" rotWithShape="1">
-              <a:gsLst>
-                <a:gs pos="0">
-                  <a:schemeClr val="tx1"/>
-                </a:gs>
-                <a:gs pos="1000">
-                  <a:schemeClr val="bg1"/>
-                </a:gs>
-                <a:gs pos="83000">
-                  <a:schemeClr val="bg1"/>
-                </a:gs>
-                <a:gs pos="100000">
-                  <a:schemeClr val="bg1"/>
-                </a:gs>
-              </a:gsLst>
-              <a:lin ang="16200000" scaled="1"/>
-              <a:tileRect/>
-            </a:gradFill>
+            <a:noFill/>
           </a:ln>
         </p:spPr>
         <p:txBody>
@@ -10003,16 +10364,10 @@
           <a:lstStyle/>
           <a:p>
             <a:r>
-              <a:rPr lang="bg-BG" sz="5300" dirty="0">
-                <a:latin typeface="Trebuchet MS" panose="020B0603020202020204" pitchFamily="34" charset="0"/>
-              </a:rPr>
-              <a:t>Симулация с </a:t>
-            </a:r>
-            <a:r>
               <a:rPr lang="en-US" sz="5300" dirty="0">
                 <a:latin typeface="Trebuchet MS" panose="020B0603020202020204" pitchFamily="34" charset="0"/>
               </a:rPr>
-              <a:t>JavaScript</a:t>
+              <a:t>Basic Reproduction Number</a:t>
             </a:r>
             <a:endParaRPr lang="en-US" sz="6600" dirty="0">
               <a:latin typeface="Trebuchet MS" panose="020B0603020202020204" pitchFamily="34" charset="0"/>
@@ -10020,6 +10375,1371 @@
           </a:p>
         </p:txBody>
       </p:sp>
+      <mc:AlternateContent xmlns:mc="http://schemas.openxmlformats.org/markup-compatibility/2006">
+        <mc:Choice xmlns:a14="http://schemas.microsoft.com/office/drawing/2010/main" Requires="a14">
+          <p:sp>
+            <p:nvSpPr>
+              <p:cNvPr id="3" name="TextBox 2"/>
+              <p:cNvSpPr txBox="1"/>
+              <p:nvPr/>
+            </p:nvSpPr>
+            <p:spPr>
+              <a:xfrm>
+                <a:off x="931985" y="2145324"/>
+                <a:ext cx="2233246" cy="1200329"/>
+              </a:xfrm>
+              <a:prstGeom prst="rect">
+                <a:avLst/>
+              </a:prstGeom>
+              <a:noFill/>
+            </p:spPr>
+            <p:txBody>
+              <a:bodyPr wrap="square" rtlCol="0">
+                <a:spAutoFit/>
+              </a:bodyPr>
+              <a:lstStyle/>
+              <a:p>
+                <a14:m>
+                  <m:oMathPara xmlns:m="http://schemas.openxmlformats.org/officeDocument/2006/math">
+                    <m:oMathParaPr>
+                      <m:jc m:val="centerGroup"/>
+                    </m:oMathParaPr>
+                    <m:oMath xmlns:m="http://schemas.openxmlformats.org/officeDocument/2006/math">
+                      <m:sSup>
+                        <m:sSupPr>
+                          <m:ctrlPr>
+                            <a:rPr lang="en-US" sz="2400" i="1" smtClean="0">
+                              <a:solidFill>
+                                <a:schemeClr val="tx1">
+                                  <a:lumMod val="85000"/>
+                                  <a:lumOff val="15000"/>
+                                </a:schemeClr>
+                              </a:solidFill>
+                              <a:latin typeface="Cambria Math" panose="02040503050406030204" pitchFamily="18" charset="0"/>
+                            </a:rPr>
+                          </m:ctrlPr>
+                        </m:sSupPr>
+                        <m:e>
+                          <m:r>
+                            <a:rPr lang="en-US" sz="2400" i="1">
+                              <a:solidFill>
+                                <a:schemeClr val="tx1">
+                                  <a:lumMod val="85000"/>
+                                  <a:lumOff val="15000"/>
+                                </a:schemeClr>
+                              </a:solidFill>
+                              <a:latin typeface="Cambria Math" panose="02040503050406030204" pitchFamily="18" charset="0"/>
+                            </a:rPr>
+                            <m:t>𝐼</m:t>
+                          </m:r>
+                        </m:e>
+                        <m:sup>
+                          <m:r>
+                            <a:rPr lang="en-US" sz="2400" i="1">
+                              <a:solidFill>
+                                <a:schemeClr val="tx1">
+                                  <a:lumMod val="85000"/>
+                                  <a:lumOff val="15000"/>
+                                </a:schemeClr>
+                              </a:solidFill>
+                              <a:latin typeface="Cambria Math" panose="02040503050406030204" pitchFamily="18" charset="0"/>
+                            </a:rPr>
+                            <m:t>′</m:t>
+                          </m:r>
+                        </m:sup>
+                      </m:sSup>
+                      <m:r>
+                        <a:rPr lang="en-US" sz="2400" i="1">
+                          <a:solidFill>
+                            <a:schemeClr val="tx1">
+                              <a:lumMod val="85000"/>
+                              <a:lumOff val="15000"/>
+                            </a:schemeClr>
+                          </a:solidFill>
+                          <a:latin typeface="Cambria Math" panose="02040503050406030204" pitchFamily="18" charset="0"/>
+                        </a:rPr>
+                        <m:t>=</m:t>
+                      </m:r>
+                      <m:r>
+                        <m:rPr>
+                          <m:sty m:val="p"/>
+                        </m:rPr>
+                        <a:rPr lang="el-GR" sz="2400" i="1">
+                          <a:solidFill>
+                            <a:schemeClr val="tx1">
+                              <a:lumMod val="85000"/>
+                              <a:lumOff val="15000"/>
+                            </a:schemeClr>
+                          </a:solidFill>
+                          <a:latin typeface="Cambria Math" panose="02040503050406030204" pitchFamily="18" charset="0"/>
+                          <a:ea typeface="Cambria Math" panose="02040503050406030204" pitchFamily="18" charset="0"/>
+                        </a:rPr>
+                        <m:t>β</m:t>
+                      </m:r>
+                      <m:r>
+                        <a:rPr lang="en-US" sz="2400" i="1">
+                          <a:solidFill>
+                            <a:schemeClr val="tx1">
+                              <a:lumMod val="85000"/>
+                              <a:lumOff val="15000"/>
+                            </a:schemeClr>
+                          </a:solidFill>
+                          <a:latin typeface="Cambria Math" panose="02040503050406030204" pitchFamily="18" charset="0"/>
+                          <a:ea typeface="Cambria Math" panose="02040503050406030204" pitchFamily="18" charset="0"/>
+                        </a:rPr>
+                        <m:t>𝑆𝐼</m:t>
+                      </m:r>
+                      <m:r>
+                        <a:rPr lang="en-US" sz="2400" i="1">
+                          <a:solidFill>
+                            <a:schemeClr val="tx1">
+                              <a:lumMod val="85000"/>
+                              <a:lumOff val="15000"/>
+                            </a:schemeClr>
+                          </a:solidFill>
+                          <a:latin typeface="Cambria Math" panose="02040503050406030204" pitchFamily="18" charset="0"/>
+                          <a:ea typeface="Cambria Math" panose="02040503050406030204" pitchFamily="18" charset="0"/>
+                        </a:rPr>
+                        <m:t>−</m:t>
+                      </m:r>
+                      <m:r>
+                        <m:rPr>
+                          <m:sty m:val="p"/>
+                        </m:rPr>
+                        <a:rPr lang="el-GR" sz="2400" i="1">
+                          <a:solidFill>
+                            <a:schemeClr val="tx1">
+                              <a:lumMod val="85000"/>
+                              <a:lumOff val="15000"/>
+                            </a:schemeClr>
+                          </a:solidFill>
+                          <a:latin typeface="Cambria Math" panose="02040503050406030204" pitchFamily="18" charset="0"/>
+                          <a:ea typeface="Cambria Math" panose="02040503050406030204" pitchFamily="18" charset="0"/>
+                        </a:rPr>
+                        <m:t>α</m:t>
+                      </m:r>
+                      <m:r>
+                        <a:rPr lang="en-US" sz="2400" i="1">
+                          <a:solidFill>
+                            <a:schemeClr val="tx1">
+                              <a:lumMod val="85000"/>
+                              <a:lumOff val="15000"/>
+                            </a:schemeClr>
+                          </a:solidFill>
+                          <a:latin typeface="Cambria Math" panose="02040503050406030204" pitchFamily="18" charset="0"/>
+                          <a:ea typeface="Cambria Math" panose="02040503050406030204" pitchFamily="18" charset="0"/>
+                        </a:rPr>
+                        <m:t>𝐼</m:t>
+                      </m:r>
+                    </m:oMath>
+                    <m:oMath xmlns:m="http://schemas.openxmlformats.org/officeDocument/2006/math">
+                      <m:sSup>
+                        <m:sSupPr>
+                          <m:ctrlPr>
+                            <a:rPr lang="en-US" sz="2400" b="0" i="1" smtClean="0">
+                              <a:solidFill>
+                                <a:schemeClr val="tx1">
+                                  <a:lumMod val="85000"/>
+                                  <a:lumOff val="15000"/>
+                                </a:schemeClr>
+                              </a:solidFill>
+                              <a:latin typeface="Cambria Math" panose="02040503050406030204" pitchFamily="18" charset="0"/>
+                              <a:ea typeface="Cambria Math" panose="02040503050406030204" pitchFamily="18" charset="0"/>
+                            </a:rPr>
+                          </m:ctrlPr>
+                        </m:sSupPr>
+                        <m:e>
+                          <m:r>
+                            <a:rPr lang="en-US" sz="2400" b="0" i="1" smtClean="0">
+                              <a:solidFill>
+                                <a:schemeClr val="tx1">
+                                  <a:lumMod val="85000"/>
+                                  <a:lumOff val="15000"/>
+                                </a:schemeClr>
+                              </a:solidFill>
+                              <a:latin typeface="Cambria Math" panose="02040503050406030204" pitchFamily="18" charset="0"/>
+                              <a:ea typeface="Cambria Math" panose="02040503050406030204" pitchFamily="18" charset="0"/>
+                            </a:rPr>
+                            <m:t>𝐼</m:t>
+                          </m:r>
+                        </m:e>
+                        <m:sup>
+                          <m:r>
+                            <a:rPr lang="en-US" sz="2400" b="0" i="1" smtClean="0">
+                              <a:solidFill>
+                                <a:schemeClr val="tx1">
+                                  <a:lumMod val="85000"/>
+                                  <a:lumOff val="15000"/>
+                                </a:schemeClr>
+                              </a:solidFill>
+                              <a:latin typeface="Cambria Math" panose="02040503050406030204" pitchFamily="18" charset="0"/>
+                              <a:ea typeface="Cambria Math" panose="02040503050406030204" pitchFamily="18" charset="0"/>
+                            </a:rPr>
+                            <m:t>′</m:t>
+                          </m:r>
+                        </m:sup>
+                      </m:sSup>
+                      <m:r>
+                        <a:rPr lang="en-US" sz="2400" b="0" i="1" smtClean="0">
+                          <a:solidFill>
+                            <a:schemeClr val="tx1">
+                              <a:lumMod val="85000"/>
+                              <a:lumOff val="15000"/>
+                            </a:schemeClr>
+                          </a:solidFill>
+                          <a:latin typeface="Cambria Math" panose="02040503050406030204" pitchFamily="18" charset="0"/>
+                          <a:ea typeface="Cambria Math" panose="02040503050406030204" pitchFamily="18" charset="0"/>
+                        </a:rPr>
+                        <m:t>=</m:t>
+                      </m:r>
+                      <m:r>
+                        <a:rPr lang="en-US" sz="2400" b="0" i="1" smtClean="0">
+                          <a:solidFill>
+                            <a:schemeClr val="tx1">
+                              <a:lumMod val="85000"/>
+                              <a:lumOff val="15000"/>
+                            </a:schemeClr>
+                          </a:solidFill>
+                          <a:latin typeface="Cambria Math" panose="02040503050406030204" pitchFamily="18" charset="0"/>
+                        </a:rPr>
+                        <m:t>(</m:t>
+                      </m:r>
+                      <m:r>
+                        <m:rPr>
+                          <m:sty m:val="p"/>
+                        </m:rPr>
+                        <a:rPr lang="el-GR" sz="2400" i="1">
+                          <a:solidFill>
+                            <a:schemeClr val="tx1">
+                              <a:lumMod val="85000"/>
+                              <a:lumOff val="15000"/>
+                            </a:schemeClr>
+                          </a:solidFill>
+                          <a:latin typeface="Cambria Math" panose="02040503050406030204" pitchFamily="18" charset="0"/>
+                          <a:ea typeface="Cambria Math" panose="02040503050406030204" pitchFamily="18" charset="0"/>
+                        </a:rPr>
+                        <m:t>β</m:t>
+                      </m:r>
+                      <m:r>
+                        <a:rPr lang="en-US" sz="2400" i="1">
+                          <a:solidFill>
+                            <a:schemeClr val="tx1">
+                              <a:lumMod val="85000"/>
+                              <a:lumOff val="15000"/>
+                            </a:schemeClr>
+                          </a:solidFill>
+                          <a:latin typeface="Cambria Math" panose="02040503050406030204" pitchFamily="18" charset="0"/>
+                          <a:ea typeface="Cambria Math" panose="02040503050406030204" pitchFamily="18" charset="0"/>
+                        </a:rPr>
+                        <m:t>𝑆</m:t>
+                      </m:r>
+                      <m:r>
+                        <a:rPr lang="en-US" sz="2400" i="1">
+                          <a:solidFill>
+                            <a:schemeClr val="tx1">
+                              <a:lumMod val="85000"/>
+                              <a:lumOff val="15000"/>
+                            </a:schemeClr>
+                          </a:solidFill>
+                          <a:latin typeface="Cambria Math" panose="02040503050406030204" pitchFamily="18" charset="0"/>
+                          <a:ea typeface="Cambria Math" panose="02040503050406030204" pitchFamily="18" charset="0"/>
+                        </a:rPr>
+                        <m:t>−</m:t>
+                      </m:r>
+                      <m:r>
+                        <m:rPr>
+                          <m:sty m:val="p"/>
+                        </m:rPr>
+                        <a:rPr lang="el-GR" sz="2400" i="1">
+                          <a:solidFill>
+                            <a:schemeClr val="tx1">
+                              <a:lumMod val="85000"/>
+                              <a:lumOff val="15000"/>
+                            </a:schemeClr>
+                          </a:solidFill>
+                          <a:latin typeface="Cambria Math" panose="02040503050406030204" pitchFamily="18" charset="0"/>
+                          <a:ea typeface="Cambria Math" panose="02040503050406030204" pitchFamily="18" charset="0"/>
+                        </a:rPr>
+                        <m:t>α</m:t>
+                      </m:r>
+                      <m:r>
+                        <a:rPr lang="en-US" sz="2400" b="0" i="1" smtClean="0">
+                          <a:solidFill>
+                            <a:schemeClr val="tx1">
+                              <a:lumMod val="85000"/>
+                              <a:lumOff val="15000"/>
+                            </a:schemeClr>
+                          </a:solidFill>
+                          <a:latin typeface="Cambria Math" panose="02040503050406030204" pitchFamily="18" charset="0"/>
+                          <a:ea typeface="Cambria Math" panose="02040503050406030204" pitchFamily="18" charset="0"/>
+                        </a:rPr>
+                        <m:t>)</m:t>
+                      </m:r>
+                      <m:r>
+                        <a:rPr lang="en-US" sz="2400" i="1">
+                          <a:solidFill>
+                            <a:schemeClr val="tx1">
+                              <a:lumMod val="85000"/>
+                              <a:lumOff val="15000"/>
+                            </a:schemeClr>
+                          </a:solidFill>
+                          <a:latin typeface="Cambria Math" panose="02040503050406030204" pitchFamily="18" charset="0"/>
+                          <a:ea typeface="Cambria Math" panose="02040503050406030204" pitchFamily="18" charset="0"/>
+                        </a:rPr>
+                        <m:t>𝐼</m:t>
+                      </m:r>
+                    </m:oMath>
+                  </m:oMathPara>
+                </a14:m>
+                <a:endParaRPr lang="en-US" sz="2400" dirty="0">
+                  <a:solidFill>
+                    <a:schemeClr val="tx1">
+                      <a:lumMod val="85000"/>
+                      <a:lumOff val="15000"/>
+                    </a:schemeClr>
+                  </a:solidFill>
+                  <a:latin typeface="Trebuchet MS" panose="020B0603020202020204" pitchFamily="34" charset="0"/>
+                </a:endParaRPr>
+              </a:p>
+              <a:p>
+                <a:endParaRPr lang="en-US" sz="2400" dirty="0"/>
+              </a:p>
+            </p:txBody>
+          </p:sp>
+        </mc:Choice>
+        <mc:Fallback>
+          <p:sp>
+            <p:nvSpPr>
+              <p:cNvPr id="3" name="TextBox 2"/>
+              <p:cNvSpPr txBox="1">
+                <a:spLocks noRot="1" noChangeAspect="1" noMove="1" noResize="1" noEditPoints="1" noAdjustHandles="1" noChangeArrowheads="1" noChangeShapeType="1" noTextEdit="1"/>
+              </p:cNvSpPr>
+              <p:nvPr/>
+            </p:nvSpPr>
+            <p:spPr>
+              <a:xfrm>
+                <a:off x="931985" y="2145324"/>
+                <a:ext cx="2233246" cy="1200329"/>
+              </a:xfrm>
+              <a:prstGeom prst="rect">
+                <a:avLst/>
+              </a:prstGeom>
+              <a:blipFill>
+                <a:blip r:embed="rId3"/>
+                <a:stretch>
+                  <a:fillRect/>
+                </a:stretch>
+              </a:blipFill>
+            </p:spPr>
+            <p:txBody>
+              <a:bodyPr/>
+              <a:lstStyle/>
+              <a:p>
+                <a:r>
+                  <a:rPr lang="en-US">
+                    <a:noFill/>
+                  </a:rPr>
+                  <a:t> </a:t>
+                </a:r>
+              </a:p>
+            </p:txBody>
+          </p:sp>
+        </mc:Fallback>
+      </mc:AlternateContent>
+      <mc:AlternateContent xmlns:mc="http://schemas.openxmlformats.org/markup-compatibility/2006">
+        <mc:Choice xmlns:a14="http://schemas.microsoft.com/office/drawing/2010/main" Requires="a14">
+          <p:sp>
+            <p:nvSpPr>
+              <p:cNvPr id="5" name="TextBox 4"/>
+              <p:cNvSpPr txBox="1"/>
+              <p:nvPr/>
+            </p:nvSpPr>
+            <p:spPr>
+              <a:xfrm>
+                <a:off x="931985" y="3141706"/>
+                <a:ext cx="4598376" cy="2031325"/>
+              </a:xfrm>
+              <a:prstGeom prst="rect">
+                <a:avLst/>
+              </a:prstGeom>
+              <a:noFill/>
+            </p:spPr>
+            <p:txBody>
+              <a:bodyPr wrap="square" rtlCol="0">
+                <a:spAutoFit/>
+              </a:bodyPr>
+              <a:lstStyle/>
+              <a:p>
+                <a:r>
+                  <a:rPr lang="bg-BG" dirty="0">
+                    <a:latin typeface="Trebuchet MS" panose="020B0603020202020204" pitchFamily="34" charset="0"/>
+                  </a:rPr>
+                  <a:t>Максимумът на </a:t>
+                </a:r>
+                <a:r>
+                  <a:rPr lang="en-US" dirty="0">
+                    <a:latin typeface="Trebuchet MS" panose="020B0603020202020204" pitchFamily="34" charset="0"/>
+                  </a:rPr>
+                  <a:t>I </a:t>
+                </a:r>
+                <a:r>
+                  <a:rPr lang="bg-BG" dirty="0">
+                    <a:latin typeface="Trebuchet MS" panose="020B0603020202020204" pitchFamily="34" charset="0"/>
+                  </a:rPr>
+                  <a:t>се достига при </a:t>
+                </a:r>
+                <a14:m>
+                  <m:oMath xmlns:m="http://schemas.openxmlformats.org/officeDocument/2006/math">
+                    <m:r>
+                      <m:rPr>
+                        <m:sty m:val="p"/>
+                      </m:rPr>
+                      <a:rPr lang="en-US" b="0" i="0" smtClean="0">
+                        <a:solidFill>
+                          <a:schemeClr val="tx1">
+                            <a:lumMod val="85000"/>
+                            <a:lumOff val="15000"/>
+                          </a:schemeClr>
+                        </a:solidFill>
+                        <a:latin typeface="Cambria Math" panose="02040503050406030204" pitchFamily="18" charset="0"/>
+                        <a:ea typeface="Cambria Math" panose="02040503050406030204" pitchFamily="18" charset="0"/>
+                      </a:rPr>
+                      <m:t>S</m:t>
+                    </m:r>
+                    <m:r>
+                      <a:rPr lang="en-US" b="0" i="0" smtClean="0">
+                        <a:solidFill>
+                          <a:schemeClr val="tx1">
+                            <a:lumMod val="85000"/>
+                            <a:lumOff val="15000"/>
+                          </a:schemeClr>
+                        </a:solidFill>
+                        <a:latin typeface="Cambria Math" panose="02040503050406030204" pitchFamily="18" charset="0"/>
+                        <a:ea typeface="Cambria Math" panose="02040503050406030204" pitchFamily="18" charset="0"/>
+                      </a:rPr>
+                      <m:t>=</m:t>
+                    </m:r>
+                    <m:r>
+                      <m:rPr>
+                        <m:sty m:val="p"/>
+                      </m:rPr>
+                      <a:rPr lang="el-GR" i="1">
+                        <a:solidFill>
+                          <a:schemeClr val="tx1">
+                            <a:lumMod val="85000"/>
+                            <a:lumOff val="15000"/>
+                          </a:schemeClr>
+                        </a:solidFill>
+                        <a:latin typeface="Cambria Math" panose="02040503050406030204" pitchFamily="18" charset="0"/>
+                        <a:ea typeface="Cambria Math" panose="02040503050406030204" pitchFamily="18" charset="0"/>
+                      </a:rPr>
+                      <m:t>α</m:t>
+                    </m:r>
+                    <m:r>
+                      <a:rPr lang="en-US" b="0" i="1" smtClean="0">
+                        <a:solidFill>
+                          <a:schemeClr val="tx1">
+                            <a:lumMod val="85000"/>
+                            <a:lumOff val="15000"/>
+                          </a:schemeClr>
+                        </a:solidFill>
+                        <a:latin typeface="Cambria Math" panose="02040503050406030204" pitchFamily="18" charset="0"/>
+                        <a:ea typeface="Cambria Math" panose="02040503050406030204" pitchFamily="18" charset="0"/>
+                      </a:rPr>
+                      <m:t>/</m:t>
+                    </m:r>
+                    <m:r>
+                      <m:rPr>
+                        <m:sty m:val="p"/>
+                      </m:rPr>
+                      <a:rPr lang="el-GR" i="1">
+                        <a:solidFill>
+                          <a:schemeClr val="tx1">
+                            <a:lumMod val="85000"/>
+                            <a:lumOff val="15000"/>
+                          </a:schemeClr>
+                        </a:solidFill>
+                        <a:latin typeface="Cambria Math" panose="02040503050406030204" pitchFamily="18" charset="0"/>
+                        <a:ea typeface="Cambria Math" panose="02040503050406030204" pitchFamily="18" charset="0"/>
+                      </a:rPr>
+                      <m:t>β</m:t>
+                    </m:r>
+                  </m:oMath>
+                </a14:m>
+                <a:endParaRPr lang="en-US" dirty="0">
+                  <a:solidFill>
+                    <a:schemeClr val="tx1">
+                      <a:lumMod val="85000"/>
+                      <a:lumOff val="15000"/>
+                    </a:schemeClr>
+                  </a:solidFill>
+                  <a:latin typeface="Trebuchet MS" panose="020B0603020202020204" pitchFamily="34" charset="0"/>
+                </a:endParaRPr>
+              </a:p>
+              <a:p>
+                <a:r>
+                  <a:rPr lang="en-US" dirty="0">
+                    <a:solidFill>
+                      <a:schemeClr val="tx1">
+                        <a:lumMod val="85000"/>
+                        <a:lumOff val="15000"/>
+                      </a:schemeClr>
+                    </a:solidFill>
+                    <a:latin typeface="Trebuchet MS" panose="020B0603020202020204" pitchFamily="34" charset="0"/>
+                  </a:rPr>
+                  <a:t>I </a:t>
+                </a:r>
+                <a:r>
+                  <a:rPr lang="bg-BG" dirty="0">
+                    <a:solidFill>
+                      <a:schemeClr val="tx1">
+                        <a:lumMod val="85000"/>
+                        <a:lumOff val="15000"/>
+                      </a:schemeClr>
+                    </a:solidFill>
+                    <a:latin typeface="Trebuchet MS" panose="020B0603020202020204" pitchFamily="34" charset="0"/>
+                  </a:rPr>
+                  <a:t>расте при </a:t>
+                </a:r>
+                <a14:m>
+                  <m:oMath xmlns:m="http://schemas.openxmlformats.org/officeDocument/2006/math">
+                    <m:r>
+                      <m:rPr>
+                        <m:sty m:val="p"/>
+                      </m:rPr>
+                      <a:rPr lang="en-US">
+                        <a:solidFill>
+                          <a:schemeClr val="tx1">
+                            <a:lumMod val="85000"/>
+                            <a:lumOff val="15000"/>
+                          </a:schemeClr>
+                        </a:solidFill>
+                        <a:latin typeface="Cambria Math" panose="02040503050406030204" pitchFamily="18" charset="0"/>
+                        <a:ea typeface="Cambria Math" panose="02040503050406030204" pitchFamily="18" charset="0"/>
+                      </a:rPr>
+                      <m:t>S</m:t>
+                    </m:r>
+                    <m:r>
+                      <a:rPr lang="en-US" b="0" i="0" smtClean="0">
+                        <a:solidFill>
+                          <a:schemeClr val="tx1">
+                            <a:lumMod val="85000"/>
+                            <a:lumOff val="15000"/>
+                          </a:schemeClr>
+                        </a:solidFill>
+                        <a:latin typeface="Cambria Math" panose="02040503050406030204" pitchFamily="18" charset="0"/>
+                        <a:ea typeface="Cambria Math" panose="02040503050406030204" pitchFamily="18" charset="0"/>
+                      </a:rPr>
+                      <m:t>&gt;</m:t>
+                    </m:r>
+                    <m:r>
+                      <m:rPr>
+                        <m:sty m:val="p"/>
+                      </m:rPr>
+                      <a:rPr lang="el-GR" i="1">
+                        <a:solidFill>
+                          <a:schemeClr val="tx1">
+                            <a:lumMod val="85000"/>
+                            <a:lumOff val="15000"/>
+                          </a:schemeClr>
+                        </a:solidFill>
+                        <a:latin typeface="Cambria Math" panose="02040503050406030204" pitchFamily="18" charset="0"/>
+                        <a:ea typeface="Cambria Math" panose="02040503050406030204" pitchFamily="18" charset="0"/>
+                      </a:rPr>
+                      <m:t>α</m:t>
+                    </m:r>
+                    <m:r>
+                      <a:rPr lang="en-US" b="0" i="1" smtClean="0">
+                        <a:solidFill>
+                          <a:schemeClr val="tx1">
+                            <a:lumMod val="85000"/>
+                            <a:lumOff val="15000"/>
+                          </a:schemeClr>
+                        </a:solidFill>
+                        <a:latin typeface="Cambria Math" panose="02040503050406030204" pitchFamily="18" charset="0"/>
+                        <a:ea typeface="Cambria Math" panose="02040503050406030204" pitchFamily="18" charset="0"/>
+                      </a:rPr>
+                      <m:t>/</m:t>
+                    </m:r>
+                    <m:r>
+                      <m:rPr>
+                        <m:sty m:val="p"/>
+                      </m:rPr>
+                      <a:rPr lang="el-GR" i="1">
+                        <a:solidFill>
+                          <a:schemeClr val="tx1">
+                            <a:lumMod val="85000"/>
+                            <a:lumOff val="15000"/>
+                          </a:schemeClr>
+                        </a:solidFill>
+                        <a:latin typeface="Cambria Math" panose="02040503050406030204" pitchFamily="18" charset="0"/>
+                        <a:ea typeface="Cambria Math" panose="02040503050406030204" pitchFamily="18" charset="0"/>
+                      </a:rPr>
+                      <m:t>β</m:t>
+                    </m:r>
+                  </m:oMath>
+                </a14:m>
+                <a:endParaRPr lang="en-US" dirty="0">
+                  <a:solidFill>
+                    <a:schemeClr val="tx1">
+                      <a:lumMod val="85000"/>
+                      <a:lumOff val="15000"/>
+                    </a:schemeClr>
+                  </a:solidFill>
+                  <a:latin typeface="Trebuchet MS" panose="020B0603020202020204" pitchFamily="34" charset="0"/>
+                  <a:ea typeface="Cambria Math" panose="02040503050406030204" pitchFamily="18" charset="0"/>
+                </a:endParaRPr>
+              </a:p>
+              <a:p>
+                <a:r>
+                  <a:rPr lang="en-US" dirty="0">
+                    <a:solidFill>
+                      <a:schemeClr val="tx1">
+                        <a:lumMod val="85000"/>
+                        <a:lumOff val="15000"/>
+                      </a:schemeClr>
+                    </a:solidFill>
+                    <a:latin typeface="Trebuchet MS" panose="020B0603020202020204" pitchFamily="34" charset="0"/>
+                  </a:rPr>
+                  <a:t>I </a:t>
+                </a:r>
+                <a:r>
+                  <a:rPr lang="bg-BG" dirty="0">
+                    <a:solidFill>
+                      <a:schemeClr val="tx1">
+                        <a:lumMod val="85000"/>
+                        <a:lumOff val="15000"/>
+                      </a:schemeClr>
+                    </a:solidFill>
+                    <a:latin typeface="Trebuchet MS" panose="020B0603020202020204" pitchFamily="34" charset="0"/>
+                  </a:rPr>
+                  <a:t>намалява при </a:t>
+                </a:r>
+                <a14:m>
+                  <m:oMath xmlns:m="http://schemas.openxmlformats.org/officeDocument/2006/math">
+                    <m:r>
+                      <m:rPr>
+                        <m:sty m:val="p"/>
+                      </m:rPr>
+                      <a:rPr lang="en-US">
+                        <a:solidFill>
+                          <a:schemeClr val="tx1">
+                            <a:lumMod val="85000"/>
+                            <a:lumOff val="15000"/>
+                          </a:schemeClr>
+                        </a:solidFill>
+                        <a:latin typeface="Cambria Math" panose="02040503050406030204" pitchFamily="18" charset="0"/>
+                        <a:ea typeface="Cambria Math" panose="02040503050406030204" pitchFamily="18" charset="0"/>
+                      </a:rPr>
+                      <m:t>S</m:t>
+                    </m:r>
+                    <m:r>
+                      <a:rPr lang="bg-BG" b="0" i="0" smtClean="0">
+                        <a:solidFill>
+                          <a:schemeClr val="tx1">
+                            <a:lumMod val="85000"/>
+                            <a:lumOff val="15000"/>
+                          </a:schemeClr>
+                        </a:solidFill>
+                        <a:latin typeface="Cambria Math" panose="02040503050406030204" pitchFamily="18" charset="0"/>
+                        <a:ea typeface="Cambria Math" panose="02040503050406030204" pitchFamily="18" charset="0"/>
+                      </a:rPr>
+                      <m:t>&lt;</m:t>
+                    </m:r>
+                    <m:r>
+                      <m:rPr>
+                        <m:sty m:val="p"/>
+                      </m:rPr>
+                      <a:rPr lang="el-GR" i="1">
+                        <a:solidFill>
+                          <a:schemeClr val="tx1">
+                            <a:lumMod val="85000"/>
+                            <a:lumOff val="15000"/>
+                          </a:schemeClr>
+                        </a:solidFill>
+                        <a:latin typeface="Cambria Math" panose="02040503050406030204" pitchFamily="18" charset="0"/>
+                        <a:ea typeface="Cambria Math" panose="02040503050406030204" pitchFamily="18" charset="0"/>
+                      </a:rPr>
+                      <m:t>α</m:t>
+                    </m:r>
+                    <m:r>
+                      <a:rPr lang="en-US" i="1">
+                        <a:solidFill>
+                          <a:schemeClr val="tx1">
+                            <a:lumMod val="85000"/>
+                            <a:lumOff val="15000"/>
+                          </a:schemeClr>
+                        </a:solidFill>
+                        <a:latin typeface="Cambria Math" panose="02040503050406030204" pitchFamily="18" charset="0"/>
+                        <a:ea typeface="Cambria Math" panose="02040503050406030204" pitchFamily="18" charset="0"/>
+                      </a:rPr>
+                      <m:t>/</m:t>
+                    </m:r>
+                    <m:r>
+                      <m:rPr>
+                        <m:sty m:val="p"/>
+                      </m:rPr>
+                      <a:rPr lang="el-GR" i="1">
+                        <a:solidFill>
+                          <a:schemeClr val="tx1">
+                            <a:lumMod val="85000"/>
+                            <a:lumOff val="15000"/>
+                          </a:schemeClr>
+                        </a:solidFill>
+                        <a:latin typeface="Cambria Math" panose="02040503050406030204" pitchFamily="18" charset="0"/>
+                        <a:ea typeface="Cambria Math" panose="02040503050406030204" pitchFamily="18" charset="0"/>
+                      </a:rPr>
+                      <m:t>β</m:t>
+                    </m:r>
+                  </m:oMath>
+                </a14:m>
+                <a:endParaRPr lang="bg-BG" dirty="0">
+                  <a:solidFill>
+                    <a:schemeClr val="tx1">
+                      <a:lumMod val="85000"/>
+                      <a:lumOff val="15000"/>
+                    </a:schemeClr>
+                  </a:solidFill>
+                  <a:latin typeface="Trebuchet MS" panose="020B0603020202020204" pitchFamily="34" charset="0"/>
+                </a:endParaRPr>
+              </a:p>
+              <a:p>
+                <a14:m>
+                  <m:oMath xmlns:m="http://schemas.openxmlformats.org/officeDocument/2006/math">
+                    <m:sSub>
+                      <m:sSubPr>
+                        <m:ctrlPr>
+                          <a:rPr lang="en-US" i="1">
+                            <a:solidFill>
+                              <a:schemeClr val="tx1">
+                                <a:lumMod val="85000"/>
+                                <a:lumOff val="15000"/>
+                              </a:schemeClr>
+                            </a:solidFill>
+                            <a:latin typeface="Cambria Math" panose="02040503050406030204" pitchFamily="18" charset="0"/>
+                            <a:ea typeface="Cambria Math" panose="02040503050406030204" pitchFamily="18" charset="0"/>
+                          </a:rPr>
+                        </m:ctrlPr>
+                      </m:sSubPr>
+                      <m:e>
+                        <m:r>
+                          <a:rPr lang="en-US" i="1">
+                            <a:solidFill>
+                              <a:schemeClr val="tx1">
+                                <a:lumMod val="85000"/>
+                                <a:lumOff val="15000"/>
+                              </a:schemeClr>
+                            </a:solidFill>
+                            <a:latin typeface="Cambria Math" panose="02040503050406030204" pitchFamily="18" charset="0"/>
+                            <a:ea typeface="Cambria Math" panose="02040503050406030204" pitchFamily="18" charset="0"/>
+                          </a:rPr>
+                          <m:t>𝑅</m:t>
+                        </m:r>
+                      </m:e>
+                      <m:sub>
+                        <m:r>
+                          <a:rPr lang="en-US" i="1">
+                            <a:solidFill>
+                              <a:schemeClr val="tx1">
+                                <a:lumMod val="85000"/>
+                                <a:lumOff val="15000"/>
+                              </a:schemeClr>
+                            </a:solidFill>
+                            <a:latin typeface="Cambria Math" panose="02040503050406030204" pitchFamily="18" charset="0"/>
+                            <a:ea typeface="Cambria Math" panose="02040503050406030204" pitchFamily="18" charset="0"/>
+                          </a:rPr>
+                          <m:t>0</m:t>
+                        </m:r>
+                      </m:sub>
+                    </m:sSub>
+                  </m:oMath>
+                </a14:m>
+                <a:r>
+                  <a:rPr lang="bg-BG" dirty="0">
+                    <a:solidFill>
+                      <a:schemeClr val="tx1">
+                        <a:lumMod val="85000"/>
+                        <a:lumOff val="15000"/>
+                      </a:schemeClr>
+                    </a:solidFill>
+                    <a:latin typeface="Trebuchet MS" panose="020B0603020202020204" pitchFamily="34" charset="0"/>
+                  </a:rPr>
+                  <a:t> -</a:t>
+                </a:r>
+                <a:r>
+                  <a:rPr lang="en-US" dirty="0">
+                    <a:solidFill>
+                      <a:schemeClr val="tx1">
+                        <a:lumMod val="85000"/>
+                        <a:lumOff val="15000"/>
+                      </a:schemeClr>
+                    </a:solidFill>
+                    <a:latin typeface="Trebuchet MS" panose="020B0603020202020204" pitchFamily="34" charset="0"/>
+                  </a:rPr>
+                  <a:t> </a:t>
+                </a:r>
+                <a:r>
+                  <a:rPr lang="bg-BG" dirty="0">
+                    <a:solidFill>
+                      <a:schemeClr val="tx1">
+                        <a:lumMod val="85000"/>
+                        <a:lumOff val="15000"/>
+                      </a:schemeClr>
+                    </a:solidFill>
+                    <a:latin typeface="Trebuchet MS" panose="020B0603020202020204" pitchFamily="34" charset="0"/>
+                  </a:rPr>
+                  <a:t>колко нови зарази ще предизвика един болен</a:t>
+                </a:r>
+              </a:p>
+              <a:p>
+                <a:endParaRPr lang="en-US" dirty="0">
+                  <a:solidFill>
+                    <a:schemeClr val="tx1">
+                      <a:lumMod val="85000"/>
+                      <a:lumOff val="15000"/>
+                    </a:schemeClr>
+                  </a:solidFill>
+                  <a:latin typeface="Trebuchet MS" panose="020B0603020202020204" pitchFamily="34" charset="0"/>
+                </a:endParaRPr>
+              </a:p>
+              <a:p>
+                <a:r>
+                  <a:rPr lang="bg-BG" dirty="0">
+                    <a:latin typeface="Trebuchet MS" panose="020B0603020202020204" pitchFamily="34" charset="0"/>
+                  </a:rPr>
+                  <a:t> </a:t>
+                </a:r>
+              </a:p>
+            </p:txBody>
+          </p:sp>
+        </mc:Choice>
+        <mc:Fallback>
+          <p:sp>
+            <p:nvSpPr>
+              <p:cNvPr id="5" name="TextBox 4"/>
+              <p:cNvSpPr txBox="1">
+                <a:spLocks noRot="1" noChangeAspect="1" noMove="1" noResize="1" noEditPoints="1" noAdjustHandles="1" noChangeArrowheads="1" noChangeShapeType="1" noTextEdit="1"/>
+              </p:cNvSpPr>
+              <p:nvPr/>
+            </p:nvSpPr>
+            <p:spPr>
+              <a:xfrm>
+                <a:off x="931985" y="3141706"/>
+                <a:ext cx="4598376" cy="2031325"/>
+              </a:xfrm>
+              <a:prstGeom prst="rect">
+                <a:avLst/>
+              </a:prstGeom>
+              <a:blipFill>
+                <a:blip r:embed="rId4"/>
+                <a:stretch>
+                  <a:fillRect l="-1194" t="-1796"/>
+                </a:stretch>
+              </a:blipFill>
+            </p:spPr>
+            <p:txBody>
+              <a:bodyPr/>
+              <a:lstStyle/>
+              <a:p>
+                <a:r>
+                  <a:rPr lang="en-US">
+                    <a:noFill/>
+                  </a:rPr>
+                  <a:t> </a:t>
+                </a:r>
+              </a:p>
+            </p:txBody>
+          </p:sp>
+        </mc:Fallback>
+      </mc:AlternateContent>
+      <mc:AlternateContent xmlns:mc="http://schemas.openxmlformats.org/markup-compatibility/2006">
+        <mc:Choice xmlns:a14="http://schemas.microsoft.com/office/drawing/2010/main" Requires="a14">
+          <p:sp>
+            <p:nvSpPr>
+              <p:cNvPr id="6" name="TextBox 5"/>
+              <p:cNvSpPr txBox="1"/>
+              <p:nvPr/>
+            </p:nvSpPr>
+            <p:spPr>
+              <a:xfrm>
+                <a:off x="931985" y="5355472"/>
+                <a:ext cx="3081613" cy="813941"/>
+              </a:xfrm>
+              <a:prstGeom prst="rect">
+                <a:avLst/>
+              </a:prstGeom>
+              <a:noFill/>
+            </p:spPr>
+            <p:txBody>
+              <a:bodyPr wrap="none" rtlCol="0">
+                <a:spAutoFit/>
+              </a:bodyPr>
+              <a:lstStyle/>
+              <a:p>
+                <a14:m>
+                  <m:oMath xmlns:m="http://schemas.openxmlformats.org/officeDocument/2006/math">
+                    <m:sSub>
+                      <m:sSubPr>
+                        <m:ctrlPr>
+                          <a:rPr lang="en-US" sz="2400" i="1">
+                            <a:solidFill>
+                              <a:schemeClr val="tx1">
+                                <a:lumMod val="85000"/>
+                                <a:lumOff val="15000"/>
+                              </a:schemeClr>
+                            </a:solidFill>
+                            <a:latin typeface="Cambria Math" panose="02040503050406030204" pitchFamily="18" charset="0"/>
+                            <a:ea typeface="Cambria Math" panose="02040503050406030204" pitchFamily="18" charset="0"/>
+                          </a:rPr>
+                        </m:ctrlPr>
+                      </m:sSubPr>
+                      <m:e>
+                        <m:r>
+                          <a:rPr lang="en-US" sz="2400" i="1">
+                            <a:solidFill>
+                              <a:schemeClr val="tx1">
+                                <a:lumMod val="85000"/>
+                                <a:lumOff val="15000"/>
+                              </a:schemeClr>
+                            </a:solidFill>
+                            <a:latin typeface="Cambria Math" panose="02040503050406030204" pitchFamily="18" charset="0"/>
+                            <a:ea typeface="Cambria Math" panose="02040503050406030204" pitchFamily="18" charset="0"/>
+                          </a:rPr>
+                          <m:t>𝑅</m:t>
+                        </m:r>
+                      </m:e>
+                      <m:sub>
+                        <m:r>
+                          <a:rPr lang="en-US" sz="2400" i="1">
+                            <a:solidFill>
+                              <a:schemeClr val="tx1">
+                                <a:lumMod val="85000"/>
+                                <a:lumOff val="15000"/>
+                              </a:schemeClr>
+                            </a:solidFill>
+                            <a:latin typeface="Cambria Math" panose="02040503050406030204" pitchFamily="18" charset="0"/>
+                            <a:ea typeface="Cambria Math" panose="02040503050406030204" pitchFamily="18" charset="0"/>
+                          </a:rPr>
+                          <m:t>0</m:t>
+                        </m:r>
+                      </m:sub>
+                    </m:sSub>
+                    <m:r>
+                      <a:rPr lang="en-US" sz="2400" b="0" i="1" smtClean="0">
+                        <a:solidFill>
+                          <a:schemeClr val="tx1">
+                            <a:lumMod val="85000"/>
+                            <a:lumOff val="15000"/>
+                          </a:schemeClr>
+                        </a:solidFill>
+                        <a:latin typeface="Cambria Math" panose="02040503050406030204" pitchFamily="18" charset="0"/>
+                        <a:ea typeface="Cambria Math" panose="02040503050406030204" pitchFamily="18" charset="0"/>
+                      </a:rPr>
+                      <m:t>&gt;1</m:t>
+                    </m:r>
+                  </m:oMath>
+                </a14:m>
+                <a:r>
+                  <a:rPr lang="bg-BG" sz="2000" b="0" dirty="0">
+                    <a:solidFill>
+                      <a:schemeClr val="tx1">
+                        <a:lumMod val="85000"/>
+                        <a:lumOff val="15000"/>
+                      </a:schemeClr>
+                    </a:solidFill>
+                    <a:ea typeface="Cambria Math" panose="02040503050406030204" pitchFamily="18" charset="0"/>
+                  </a:rPr>
+                  <a:t> – няма епидемия </a:t>
+                </a:r>
+                <a:endParaRPr lang="en-US" sz="2000" b="0" dirty="0">
+                  <a:solidFill>
+                    <a:schemeClr val="tx1">
+                      <a:lumMod val="85000"/>
+                      <a:lumOff val="15000"/>
+                    </a:schemeClr>
+                  </a:solidFill>
+                  <a:ea typeface="Cambria Math" panose="02040503050406030204" pitchFamily="18" charset="0"/>
+                </a:endParaRPr>
+              </a:p>
+              <a:p>
+                <a14:m>
+                  <m:oMath xmlns:m="http://schemas.openxmlformats.org/officeDocument/2006/math">
+                    <m:sSub>
+                      <m:sSubPr>
+                        <m:ctrlPr>
+                          <a:rPr lang="en-US" sz="2400" i="1">
+                            <a:solidFill>
+                              <a:schemeClr val="tx1">
+                                <a:lumMod val="85000"/>
+                                <a:lumOff val="15000"/>
+                              </a:schemeClr>
+                            </a:solidFill>
+                            <a:latin typeface="Cambria Math" panose="02040503050406030204" pitchFamily="18" charset="0"/>
+                            <a:ea typeface="Cambria Math" panose="02040503050406030204" pitchFamily="18" charset="0"/>
+                          </a:rPr>
+                        </m:ctrlPr>
+                      </m:sSubPr>
+                      <m:e>
+                        <m:r>
+                          <a:rPr lang="en-US" sz="2400" i="1">
+                            <a:solidFill>
+                              <a:schemeClr val="tx1">
+                                <a:lumMod val="85000"/>
+                                <a:lumOff val="15000"/>
+                              </a:schemeClr>
+                            </a:solidFill>
+                            <a:latin typeface="Cambria Math" panose="02040503050406030204" pitchFamily="18" charset="0"/>
+                            <a:ea typeface="Cambria Math" panose="02040503050406030204" pitchFamily="18" charset="0"/>
+                          </a:rPr>
+                          <m:t>𝑅</m:t>
+                        </m:r>
+                      </m:e>
+                      <m:sub>
+                        <m:r>
+                          <a:rPr lang="en-US" sz="2400" i="1">
+                            <a:solidFill>
+                              <a:schemeClr val="tx1">
+                                <a:lumMod val="85000"/>
+                                <a:lumOff val="15000"/>
+                              </a:schemeClr>
+                            </a:solidFill>
+                            <a:latin typeface="Cambria Math" panose="02040503050406030204" pitchFamily="18" charset="0"/>
+                            <a:ea typeface="Cambria Math" panose="02040503050406030204" pitchFamily="18" charset="0"/>
+                          </a:rPr>
+                          <m:t>0</m:t>
+                        </m:r>
+                      </m:sub>
+                    </m:sSub>
+                    <m:r>
+                      <a:rPr lang="en-US" sz="2400" i="1">
+                        <a:solidFill>
+                          <a:schemeClr val="tx1">
+                            <a:lumMod val="85000"/>
+                            <a:lumOff val="15000"/>
+                          </a:schemeClr>
+                        </a:solidFill>
+                        <a:latin typeface="Cambria Math" panose="02040503050406030204" pitchFamily="18" charset="0"/>
+                        <a:ea typeface="Cambria Math" panose="02040503050406030204" pitchFamily="18" charset="0"/>
+                      </a:rPr>
+                      <m:t>&gt;1</m:t>
+                    </m:r>
+                    <m:r>
+                      <a:rPr lang="bg-BG" sz="2400" b="0" i="1" smtClean="0">
+                        <a:solidFill>
+                          <a:schemeClr val="tx1">
+                            <a:lumMod val="85000"/>
+                            <a:lumOff val="15000"/>
+                          </a:schemeClr>
+                        </a:solidFill>
+                        <a:latin typeface="Cambria Math" panose="02040503050406030204" pitchFamily="18" charset="0"/>
+                        <a:ea typeface="Cambria Math" panose="02040503050406030204" pitchFamily="18" charset="0"/>
+                      </a:rPr>
+                      <m:t> </m:t>
+                    </m:r>
+                  </m:oMath>
+                </a14:m>
+                <a:r>
+                  <a:rPr lang="bg-BG" sz="2000" dirty="0">
+                    <a:solidFill>
+                      <a:schemeClr val="tx1">
+                        <a:lumMod val="85000"/>
+                        <a:lumOff val="15000"/>
+                      </a:schemeClr>
+                    </a:solidFill>
+                    <a:ea typeface="Cambria Math" panose="02040503050406030204" pitchFamily="18" charset="0"/>
+                  </a:rPr>
+                  <a:t>–</a:t>
+                </a:r>
+                <a:r>
+                  <a:rPr lang="bg-BG" sz="2000" dirty="0"/>
+                  <a:t> има епидемия</a:t>
+                </a:r>
+                <a:r>
+                  <a:rPr lang="bg-BG" sz="1600" dirty="0"/>
+                  <a:t> </a:t>
+                </a:r>
+                <a:endParaRPr lang="en-US" dirty="0"/>
+              </a:p>
+            </p:txBody>
+          </p:sp>
+        </mc:Choice>
+        <mc:Fallback>
+          <p:sp>
+            <p:nvSpPr>
+              <p:cNvPr id="6" name="TextBox 5"/>
+              <p:cNvSpPr txBox="1">
+                <a:spLocks noRot="1" noChangeAspect="1" noMove="1" noResize="1" noEditPoints="1" noAdjustHandles="1" noChangeArrowheads="1" noChangeShapeType="1" noTextEdit="1"/>
+              </p:cNvSpPr>
+              <p:nvPr/>
+            </p:nvSpPr>
+            <p:spPr>
+              <a:xfrm>
+                <a:off x="931985" y="5355472"/>
+                <a:ext cx="3081613" cy="813941"/>
+              </a:xfrm>
+              <a:prstGeom prst="rect">
+                <a:avLst/>
+              </a:prstGeom>
+              <a:blipFill>
+                <a:blip r:embed="rId5"/>
+                <a:stretch>
+                  <a:fillRect l="-594" r="-1188" b="-12782"/>
+                </a:stretch>
+              </a:blipFill>
+            </p:spPr>
+            <p:txBody>
+              <a:bodyPr/>
+              <a:lstStyle/>
+              <a:p>
+                <a:r>
+                  <a:rPr lang="en-US">
+                    <a:noFill/>
+                  </a:rPr>
+                  <a:t> </a:t>
+                </a:r>
+              </a:p>
+            </p:txBody>
+          </p:sp>
+        </mc:Fallback>
+      </mc:AlternateContent>
+      <mc:AlternateContent xmlns:mc="http://schemas.openxmlformats.org/markup-compatibility/2006">
+        <mc:Choice xmlns:a14="http://schemas.microsoft.com/office/drawing/2010/main" Requires="a14">
+          <p:sp>
+            <p:nvSpPr>
+              <p:cNvPr id="7" name="TextBox 6"/>
+              <p:cNvSpPr txBox="1"/>
+              <p:nvPr/>
+            </p:nvSpPr>
+            <p:spPr>
+              <a:xfrm>
+                <a:off x="931985" y="4856855"/>
+                <a:ext cx="1869166" cy="830997"/>
+              </a:xfrm>
+              <a:prstGeom prst="rect">
+                <a:avLst/>
+              </a:prstGeom>
+              <a:noFill/>
+            </p:spPr>
+            <p:txBody>
+              <a:bodyPr wrap="none" rtlCol="0">
+                <a:spAutoFit/>
+              </a:bodyPr>
+              <a:lstStyle/>
+              <a:p>
+                <a14:m>
+                  <m:oMathPara xmlns:m="http://schemas.openxmlformats.org/officeDocument/2006/math">
+                    <m:oMathParaPr>
+                      <m:jc m:val="centerGroup"/>
+                    </m:oMathParaPr>
+                    <m:oMath xmlns:m="http://schemas.openxmlformats.org/officeDocument/2006/math">
+                      <m:sSub>
+                        <m:sSubPr>
+                          <m:ctrlPr>
+                            <a:rPr lang="en-US" sz="2400" i="1">
+                              <a:solidFill>
+                                <a:schemeClr val="tx1">
+                                  <a:lumMod val="85000"/>
+                                  <a:lumOff val="15000"/>
+                                </a:schemeClr>
+                              </a:solidFill>
+                              <a:latin typeface="Cambria Math" panose="02040503050406030204" pitchFamily="18" charset="0"/>
+                              <a:ea typeface="Cambria Math" panose="02040503050406030204" pitchFamily="18" charset="0"/>
+                            </a:rPr>
+                          </m:ctrlPr>
+                        </m:sSubPr>
+                        <m:e>
+                          <m:r>
+                            <a:rPr lang="en-US" sz="2400" i="1">
+                              <a:solidFill>
+                                <a:schemeClr val="tx1">
+                                  <a:lumMod val="85000"/>
+                                  <a:lumOff val="15000"/>
+                                </a:schemeClr>
+                              </a:solidFill>
+                              <a:latin typeface="Cambria Math" panose="02040503050406030204" pitchFamily="18" charset="0"/>
+                              <a:ea typeface="Cambria Math" panose="02040503050406030204" pitchFamily="18" charset="0"/>
+                            </a:rPr>
+                            <m:t>𝑅</m:t>
+                          </m:r>
+                        </m:e>
+                        <m:sub>
+                          <m:r>
+                            <a:rPr lang="en-US" sz="2400" i="1">
+                              <a:solidFill>
+                                <a:schemeClr val="tx1">
+                                  <a:lumMod val="85000"/>
+                                  <a:lumOff val="15000"/>
+                                </a:schemeClr>
+                              </a:solidFill>
+                              <a:latin typeface="Cambria Math" panose="02040503050406030204" pitchFamily="18" charset="0"/>
+                              <a:ea typeface="Cambria Math" panose="02040503050406030204" pitchFamily="18" charset="0"/>
+                            </a:rPr>
+                            <m:t>0</m:t>
+                          </m:r>
+                        </m:sub>
+                      </m:sSub>
+                      <m:r>
+                        <a:rPr lang="en-US" sz="2400" dirty="0">
+                          <a:solidFill>
+                            <a:schemeClr val="tx1">
+                              <a:lumMod val="85000"/>
+                              <a:lumOff val="15000"/>
+                            </a:schemeClr>
+                          </a:solidFill>
+                          <a:latin typeface="Cambria Math" panose="02040503050406030204" pitchFamily="18" charset="0"/>
+                          <a:ea typeface="Cambria Math" panose="02040503050406030204" pitchFamily="18" charset="0"/>
+                        </a:rPr>
+                        <m:t>= </m:t>
+                      </m:r>
+                      <m:r>
+                        <m:rPr>
+                          <m:sty m:val="p"/>
+                        </m:rPr>
+                        <a:rPr lang="el-GR" sz="2400" i="1">
+                          <a:solidFill>
+                            <a:schemeClr val="tx1">
+                              <a:lumMod val="85000"/>
+                              <a:lumOff val="15000"/>
+                            </a:schemeClr>
+                          </a:solidFill>
+                          <a:latin typeface="Cambria Math" panose="02040503050406030204" pitchFamily="18" charset="0"/>
+                          <a:ea typeface="Cambria Math" panose="02040503050406030204" pitchFamily="18" charset="0"/>
+                        </a:rPr>
+                        <m:t>α</m:t>
+                      </m:r>
+                      <m:sSub>
+                        <m:sSubPr>
+                          <m:ctrlPr>
+                            <a:rPr lang="en-US" sz="2400" i="1">
+                              <a:solidFill>
+                                <a:schemeClr val="tx1">
+                                  <a:lumMod val="85000"/>
+                                  <a:lumOff val="15000"/>
+                                </a:schemeClr>
+                              </a:solidFill>
+                              <a:latin typeface="Cambria Math" panose="02040503050406030204" pitchFamily="18" charset="0"/>
+                              <a:ea typeface="Cambria Math" panose="02040503050406030204" pitchFamily="18" charset="0"/>
+                            </a:rPr>
+                          </m:ctrlPr>
+                        </m:sSubPr>
+                        <m:e>
+                          <m:r>
+                            <a:rPr lang="en-US" sz="2400" i="1">
+                              <a:solidFill>
+                                <a:schemeClr val="tx1">
+                                  <a:lumMod val="85000"/>
+                                  <a:lumOff val="15000"/>
+                                </a:schemeClr>
+                              </a:solidFill>
+                              <a:latin typeface="Cambria Math" panose="02040503050406030204" pitchFamily="18" charset="0"/>
+                              <a:ea typeface="Cambria Math" panose="02040503050406030204" pitchFamily="18" charset="0"/>
+                            </a:rPr>
+                            <m:t>𝑆</m:t>
+                          </m:r>
+                        </m:e>
+                        <m:sub>
+                          <m:r>
+                            <a:rPr lang="en-US" sz="2400" i="1">
+                              <a:solidFill>
+                                <a:schemeClr val="tx1">
+                                  <a:lumMod val="85000"/>
+                                  <a:lumOff val="15000"/>
+                                </a:schemeClr>
+                              </a:solidFill>
+                              <a:latin typeface="Cambria Math" panose="02040503050406030204" pitchFamily="18" charset="0"/>
+                              <a:ea typeface="Cambria Math" panose="02040503050406030204" pitchFamily="18" charset="0"/>
+                            </a:rPr>
+                            <m:t>0</m:t>
+                          </m:r>
+                        </m:sub>
+                      </m:sSub>
+                      <m:r>
+                        <a:rPr lang="en-US" sz="2400" i="1">
+                          <a:solidFill>
+                            <a:schemeClr val="tx1">
+                              <a:lumMod val="85000"/>
+                              <a:lumOff val="15000"/>
+                            </a:schemeClr>
+                          </a:solidFill>
+                          <a:latin typeface="Cambria Math" panose="02040503050406030204" pitchFamily="18" charset="0"/>
+                          <a:ea typeface="Cambria Math" panose="02040503050406030204" pitchFamily="18" charset="0"/>
+                        </a:rPr>
+                        <m:t>/</m:t>
+                      </m:r>
+                      <m:r>
+                        <m:rPr>
+                          <m:sty m:val="p"/>
+                        </m:rPr>
+                        <a:rPr lang="el-GR" sz="2400" i="1">
+                          <a:solidFill>
+                            <a:schemeClr val="tx1">
+                              <a:lumMod val="85000"/>
+                              <a:lumOff val="15000"/>
+                            </a:schemeClr>
+                          </a:solidFill>
+                          <a:latin typeface="Cambria Math" panose="02040503050406030204" pitchFamily="18" charset="0"/>
+                          <a:ea typeface="Cambria Math" panose="02040503050406030204" pitchFamily="18" charset="0"/>
+                        </a:rPr>
+                        <m:t>β</m:t>
+                      </m:r>
+                    </m:oMath>
+                  </m:oMathPara>
+                </a14:m>
+                <a:endParaRPr lang="en-US" sz="2400" dirty="0">
+                  <a:solidFill>
+                    <a:schemeClr val="tx1">
+                      <a:lumMod val="85000"/>
+                      <a:lumOff val="15000"/>
+                    </a:schemeClr>
+                  </a:solidFill>
+                  <a:latin typeface="Trebuchet MS" panose="020B0603020202020204" pitchFamily="34" charset="0"/>
+                </a:endParaRPr>
+              </a:p>
+              <a:p>
+                <a:endParaRPr lang="en-US" sz="2400" dirty="0"/>
+              </a:p>
+            </p:txBody>
+          </p:sp>
+        </mc:Choice>
+        <mc:Fallback>
+          <p:sp>
+            <p:nvSpPr>
+              <p:cNvPr id="7" name="TextBox 6"/>
+              <p:cNvSpPr txBox="1">
+                <a:spLocks noRot="1" noChangeAspect="1" noMove="1" noResize="1" noEditPoints="1" noAdjustHandles="1" noChangeArrowheads="1" noChangeShapeType="1" noTextEdit="1"/>
+              </p:cNvSpPr>
+              <p:nvPr/>
+            </p:nvSpPr>
+            <p:spPr>
+              <a:xfrm>
+                <a:off x="931985" y="4856855"/>
+                <a:ext cx="1869166" cy="830997"/>
+              </a:xfrm>
+              <a:prstGeom prst="rect">
+                <a:avLst/>
+              </a:prstGeom>
+              <a:blipFill>
+                <a:blip r:embed="rId6"/>
+                <a:stretch>
+                  <a:fillRect/>
+                </a:stretch>
+              </a:blipFill>
+            </p:spPr>
+            <p:txBody>
+              <a:bodyPr/>
+              <a:lstStyle/>
+              <a:p>
+                <a:r>
+                  <a:rPr lang="en-US">
+                    <a:noFill/>
+                  </a:rPr>
+                  <a:t> </a:t>
+                </a:r>
+              </a:p>
+            </p:txBody>
+          </p:sp>
+        </mc:Fallback>
+      </mc:AlternateContent>
     </p:spTree>
     <p:extLst>
       <p:ext uri="{BB962C8B-B14F-4D97-AF65-F5344CB8AC3E}">

</xml_diff>

<commit_message>
Eddited last slide of presentation. Added pdf.
</commit_message>
<xml_diff>
--- a/MathematicalModelingOfEpidemology.pptx
+++ b/MathematicalModelingOfEpidemology.pptx
@@ -332,7 +332,7 @@
             <a:fld id="{96DFF08F-DC6B-4601-B491-B0F83F6DD2DA}" type="datetimeFigureOut">
               <a:rPr lang="en-US" dirty="0"/>
               <a:pPr/>
-              <a:t>05-Apr-17</a:t>
+              <a:t>06-Apr-17</a:t>
             </a:fld>
             <a:endParaRPr lang="en-US" dirty="0"/>
           </a:p>
@@ -549,7 +549,7 @@
           <a:p>
             <a:fld id="{96DFF08F-DC6B-4601-B491-B0F83F6DD2DA}" type="datetimeFigureOut">
               <a:rPr lang="en-US" dirty="0"/>
-              <a:t>05-Apr-17</a:t>
+              <a:t>06-Apr-17</a:t>
             </a:fld>
             <a:endParaRPr lang="en-US" dirty="0"/>
           </a:p>
@@ -724,7 +724,7 @@
           <a:p>
             <a:fld id="{96DFF08F-DC6B-4601-B491-B0F83F6DD2DA}" type="datetimeFigureOut">
               <a:rPr lang="en-US" dirty="0"/>
-              <a:t>05-Apr-17</a:t>
+              <a:t>06-Apr-17</a:t>
             </a:fld>
             <a:endParaRPr lang="en-US" dirty="0"/>
           </a:p>
@@ -910,7 +910,7 @@
             <a:fld id="{96DFF08F-DC6B-4601-B491-B0F83F6DD2DA}" type="datetimeFigureOut">
               <a:rPr lang="en-US" smtClean="0"/>
               <a:pPr/>
-              <a:t>05-Apr-17</a:t>
+              <a:t>06-Apr-17</a:t>
             </a:fld>
             <a:endParaRPr lang="en-US" dirty="0"/>
           </a:p>
@@ -1079,7 +1079,7 @@
           <a:p>
             <a:fld id="{96DFF08F-DC6B-4601-B491-B0F83F6DD2DA}" type="datetimeFigureOut">
               <a:rPr lang="en-US" smtClean="0"/>
-              <a:t>05-Apr-17</a:t>
+              <a:t>06-Apr-17</a:t>
             </a:fld>
             <a:endParaRPr lang="en-US" dirty="0"/>
           </a:p>
@@ -1324,7 +1324,7 @@
           <a:p>
             <a:fld id="{96DFF08F-DC6B-4601-B491-B0F83F6DD2DA}" type="datetimeFigureOut">
               <a:rPr lang="en-US" smtClean="0"/>
-              <a:t>05-Apr-17</a:t>
+              <a:t>06-Apr-17</a:t>
             </a:fld>
             <a:endParaRPr lang="en-US" dirty="0"/>
           </a:p>
@@ -1553,7 +1553,7 @@
           <a:p>
             <a:fld id="{96DFF08F-DC6B-4601-B491-B0F83F6DD2DA}" type="datetimeFigureOut">
               <a:rPr lang="en-US" smtClean="0"/>
-              <a:t>05-Apr-17</a:t>
+              <a:t>06-Apr-17</a:t>
             </a:fld>
             <a:endParaRPr lang="en-US" dirty="0"/>
           </a:p>
@@ -1917,7 +1917,7 @@
           <a:p>
             <a:fld id="{96DFF08F-DC6B-4601-B491-B0F83F6DD2DA}" type="datetimeFigureOut">
               <a:rPr lang="en-US" smtClean="0"/>
-              <a:t>05-Apr-17</a:t>
+              <a:t>06-Apr-17</a:t>
             </a:fld>
             <a:endParaRPr lang="en-US" dirty="0"/>
           </a:p>
@@ -2034,7 +2034,7 @@
           <a:p>
             <a:fld id="{96DFF08F-DC6B-4601-B491-B0F83F6DD2DA}" type="datetimeFigureOut">
               <a:rPr lang="en-US" smtClean="0"/>
-              <a:t>05-Apr-17</a:t>
+              <a:t>06-Apr-17</a:t>
             </a:fld>
             <a:endParaRPr lang="en-US" dirty="0"/>
           </a:p>
@@ -2129,7 +2129,7 @@
           <a:p>
             <a:fld id="{96DFF08F-DC6B-4601-B491-B0F83F6DD2DA}" type="datetimeFigureOut">
               <a:rPr lang="en-US" smtClean="0"/>
-              <a:t>05-Apr-17</a:t>
+              <a:t>06-Apr-17</a:t>
             </a:fld>
             <a:endParaRPr lang="en-US" dirty="0"/>
           </a:p>
@@ -2404,7 +2404,7 @@
           <a:p>
             <a:fld id="{96DFF08F-DC6B-4601-B491-B0F83F6DD2DA}" type="datetimeFigureOut">
               <a:rPr lang="en-US" smtClean="0"/>
-              <a:t>05-Apr-17</a:t>
+              <a:t>06-Apr-17</a:t>
             </a:fld>
             <a:endParaRPr lang="en-US" dirty="0"/>
           </a:p>
@@ -2574,7 +2574,7 @@
           <a:p>
             <a:fld id="{96DFF08F-DC6B-4601-B491-B0F83F6DD2DA}" type="datetimeFigureOut">
               <a:rPr lang="en-US" dirty="0"/>
-              <a:t>05-Apr-17</a:t>
+              <a:t>06-Apr-17</a:t>
             </a:fld>
             <a:endParaRPr lang="en-US" dirty="0"/>
           </a:p>
@@ -2821,7 +2821,7 @@
           <a:p>
             <a:fld id="{96DFF08F-DC6B-4601-B491-B0F83F6DD2DA}" type="datetimeFigureOut">
               <a:rPr lang="en-US" smtClean="0"/>
-              <a:t>05-Apr-17</a:t>
+              <a:t>06-Apr-17</a:t>
             </a:fld>
             <a:endParaRPr lang="en-US" dirty="0"/>
           </a:p>
@@ -2989,7 +2989,7 @@
           <a:p>
             <a:fld id="{96DFF08F-DC6B-4601-B491-B0F83F6DD2DA}" type="datetimeFigureOut">
               <a:rPr lang="en-US" smtClean="0"/>
-              <a:t>05-Apr-17</a:t>
+              <a:t>06-Apr-17</a:t>
             </a:fld>
             <a:endParaRPr lang="en-US" dirty="0"/>
           </a:p>
@@ -3167,7 +3167,7 @@
           <a:p>
             <a:fld id="{96DFF08F-DC6B-4601-B491-B0F83F6DD2DA}" type="datetimeFigureOut">
               <a:rPr lang="en-US" smtClean="0"/>
-              <a:t>05-Apr-17</a:t>
+              <a:t>06-Apr-17</a:t>
             </a:fld>
             <a:endParaRPr lang="en-US" dirty="0"/>
           </a:p>
@@ -3418,7 +3418,7 @@
           <a:p>
             <a:fld id="{96DFF08F-DC6B-4601-B491-B0F83F6DD2DA}" type="datetimeFigureOut">
               <a:rPr lang="en-US" dirty="0"/>
-              <a:t>05-Apr-17</a:t>
+              <a:t>06-Apr-17</a:t>
             </a:fld>
             <a:endParaRPr lang="en-US" dirty="0"/>
           </a:p>
@@ -3736,7 +3736,7 @@
           <a:p>
             <a:fld id="{96DFF08F-DC6B-4601-B491-B0F83F6DD2DA}" type="datetimeFigureOut">
               <a:rPr lang="en-US" dirty="0"/>
-              <a:t>05-Apr-17</a:t>
+              <a:t>06-Apr-17</a:t>
             </a:fld>
             <a:endParaRPr lang="en-US" dirty="0"/>
           </a:p>
@@ -4155,7 +4155,7 @@
           <a:p>
             <a:fld id="{96DFF08F-DC6B-4601-B491-B0F83F6DD2DA}" type="datetimeFigureOut">
               <a:rPr lang="en-US" dirty="0"/>
-              <a:t>05-Apr-17</a:t>
+              <a:t>06-Apr-17</a:t>
             </a:fld>
             <a:endParaRPr lang="en-US" dirty="0"/>
           </a:p>
@@ -4268,7 +4268,7 @@
           <a:p>
             <a:fld id="{96DFF08F-DC6B-4601-B491-B0F83F6DD2DA}" type="datetimeFigureOut">
               <a:rPr lang="en-US" dirty="0"/>
-              <a:t>05-Apr-17</a:t>
+              <a:t>06-Apr-17</a:t>
             </a:fld>
             <a:endParaRPr lang="en-US" dirty="0"/>
           </a:p>
@@ -4358,7 +4358,7 @@
           <a:p>
             <a:fld id="{96DFF08F-DC6B-4601-B491-B0F83F6DD2DA}" type="datetimeFigureOut">
               <a:rPr lang="en-US" dirty="0"/>
-              <a:t>05-Apr-17</a:t>
+              <a:t>06-Apr-17</a:t>
             </a:fld>
             <a:endParaRPr lang="en-US" dirty="0"/>
           </a:p>
@@ -4643,7 +4643,7 @@
           <a:p>
             <a:fld id="{96DFF08F-DC6B-4601-B491-B0F83F6DD2DA}" type="datetimeFigureOut">
               <a:rPr lang="en-US" dirty="0"/>
-              <a:t>05-Apr-17</a:t>
+              <a:t>06-Apr-17</a:t>
             </a:fld>
             <a:endParaRPr lang="en-US" dirty="0"/>
           </a:p>
@@ -4910,7 +4910,7 @@
           <a:p>
             <a:fld id="{96DFF08F-DC6B-4601-B491-B0F83F6DD2DA}" type="datetimeFigureOut">
               <a:rPr lang="en-US" dirty="0"/>
-              <a:t>05-Apr-17</a:t>
+              <a:t>06-Apr-17</a:t>
             </a:fld>
             <a:endParaRPr lang="en-US" dirty="0"/>
           </a:p>
@@ -5165,7 +5165,7 @@
             <a:fld id="{96DFF08F-DC6B-4601-B491-B0F83F6DD2DA}" type="datetimeFigureOut">
               <a:rPr lang="en-US" dirty="0"/>
               <a:pPr/>
-              <a:t>05-Apr-17</a:t>
+              <a:t>06-Apr-17</a:t>
             </a:fld>
             <a:endParaRPr lang="en-US" dirty="0"/>
           </a:p>
@@ -5756,7 +5756,7 @@
             <a:fld id="{96DFF08F-DC6B-4601-B491-B0F83F6DD2DA}" type="datetimeFigureOut">
               <a:rPr lang="en-US" smtClean="0"/>
               <a:pPr/>
-              <a:t>05-Apr-17</a:t>
+              <a:t>06-Apr-17</a:t>
             </a:fld>
             <a:endParaRPr lang="en-US" dirty="0"/>
           </a:p>
@@ -6441,19 +6441,19 @@
         </p:nvSpPr>
         <p:spPr>
           <a:xfrm>
-            <a:off x="1143000" y="2376854"/>
-            <a:ext cx="5671038" cy="1356360"/>
+            <a:off x="307729" y="2640623"/>
+            <a:ext cx="7183317" cy="1356360"/>
           </a:xfrm>
         </p:spPr>
         <p:txBody>
           <a:bodyPr>
-            <a:normAutofit/>
+            <a:normAutofit fontScale="90000"/>
           </a:bodyPr>
           <a:lstStyle/>
           <a:p>
             <a:r>
               <a:rPr lang="bg-BG" sz="5400" dirty="0"/>
-              <a:t>Благодаря ви!</a:t>
+              <a:t>Благодаря за вниманието</a:t>
             </a:r>
             <a:endParaRPr lang="en-US" sz="5400" dirty="0"/>
           </a:p>
@@ -8902,8 +8902,8 @@
           </a:p>
         </p:txBody>
       </p:sp>
-      <mc:AlternateContent xmlns:mc="http://schemas.openxmlformats.org/markup-compatibility/2006">
-        <mc:Choice xmlns:a14="http://schemas.microsoft.com/office/drawing/2010/main" Requires="a14">
+      <mc:AlternateContent xmlns:mc="http://schemas.openxmlformats.org/markup-compatibility/2006" xmlns:a14="http://schemas.microsoft.com/office/drawing/2010/main">
+        <mc:Choice Requires="a14">
           <p:sp>
             <p:nvSpPr>
               <p:cNvPr id="3" name="Content Placeholder 2"/>
@@ -9015,19 +9015,7 @@
                           </a:solidFill>
                           <a:latin typeface="Cambria Math" panose="02040503050406030204" pitchFamily="18" charset="0"/>
                         </a:rPr>
-                        <m:t>𝑆</m:t>
-                      </m:r>
-                      <m:r>
-                        <a:rPr lang="en-US" sz="3200" b="0" i="1" smtClean="0">
-                          <a:solidFill>
-                            <a:schemeClr val="tx1">
-                              <a:lumMod val="85000"/>
-                              <a:lumOff val="15000"/>
-                            </a:schemeClr>
-                          </a:solidFill>
-                          <a:latin typeface="Cambria Math" panose="02040503050406030204" pitchFamily="18" charset="0"/>
-                        </a:rPr>
-                        <m:t>𝐼</m:t>
+                        <m:t>𝑆𝐼</m:t>
                       </m:r>
                       <m:r>
                         <a:rPr lang="en-US" sz="3200" b="0" i="1" smtClean="0">
@@ -9267,7 +9255,7 @@
             </p:txBody>
           </p:sp>
         </mc:Choice>
-        <mc:Fallback>
+        <mc:Fallback xmlns="">
           <p:sp>
             <p:nvSpPr>
               <p:cNvPr id="3" name="Content Placeholder 2"/>
@@ -10375,8 +10363,8 @@
           </a:p>
         </p:txBody>
       </p:sp>
-      <mc:AlternateContent xmlns:mc="http://schemas.openxmlformats.org/markup-compatibility/2006">
-        <mc:Choice xmlns:a14="http://schemas.microsoft.com/office/drawing/2010/main" Requires="a14">
+      <mc:AlternateContent xmlns:mc="http://schemas.openxmlformats.org/markup-compatibility/2006" xmlns:a14="http://schemas.microsoft.com/office/drawing/2010/main">
+        <mc:Choice Requires="a14">
           <p:sp>
             <p:nvSpPr>
               <p:cNvPr id="3" name="TextBox 2"/>
@@ -10399,6 +10387,7 @@
               </a:bodyPr>
               <a:lstStyle/>
               <a:p>
+                <a:pPr/>
                 <a14:m>
                   <m:oMathPara xmlns:m="http://schemas.openxmlformats.org/officeDocument/2006/math">
                     <m:oMathParaPr>
@@ -10707,7 +10696,7 @@
             </p:txBody>
           </p:sp>
         </mc:Choice>
-        <mc:Fallback>
+        <mc:Fallback xmlns="">
           <p:sp>
             <p:nvSpPr>
               <p:cNvPr id="3" name="TextBox 2"/>
@@ -10746,8 +10735,8 @@
           </p:sp>
         </mc:Fallback>
       </mc:AlternateContent>
-      <mc:AlternateContent xmlns:mc="http://schemas.openxmlformats.org/markup-compatibility/2006">
-        <mc:Choice xmlns:a14="http://schemas.microsoft.com/office/drawing/2010/main" Requires="a14">
+      <mc:AlternateContent xmlns:mc="http://schemas.openxmlformats.org/markup-compatibility/2006" xmlns:a14="http://schemas.microsoft.com/office/drawing/2010/main">
+        <mc:Choice Requires="a14">
           <p:sp>
             <p:nvSpPr>
               <p:cNvPr id="5" name="TextBox 4"/>
@@ -11213,7 +11202,7 @@
             </p:txBody>
           </p:sp>
         </mc:Choice>
-        <mc:Fallback>
+        <mc:Fallback xmlns="">
           <p:sp>
             <p:nvSpPr>
               <p:cNvPr id="5" name="TextBox 4"/>
@@ -11252,8 +11241,8 @@
           </p:sp>
         </mc:Fallback>
       </mc:AlternateContent>
-      <mc:AlternateContent xmlns:mc="http://schemas.openxmlformats.org/markup-compatibility/2006">
-        <mc:Choice xmlns:a14="http://schemas.microsoft.com/office/drawing/2010/main" Requires="a14">
+      <mc:AlternateContent xmlns:mc="http://schemas.openxmlformats.org/markup-compatibility/2006" xmlns:a14="http://schemas.microsoft.com/office/drawing/2010/main">
+        <mc:Choice Requires="a14">
           <p:sp>
             <p:nvSpPr>
               <p:cNvPr id="6" name="TextBox 5"/>
@@ -11463,7 +11452,7 @@
             </p:txBody>
           </p:sp>
         </mc:Choice>
-        <mc:Fallback>
+        <mc:Fallback xmlns="">
           <p:sp>
             <p:nvSpPr>
               <p:cNvPr id="6" name="TextBox 5"/>
@@ -11502,8 +11491,8 @@
           </p:sp>
         </mc:Fallback>
       </mc:AlternateContent>
-      <mc:AlternateContent xmlns:mc="http://schemas.openxmlformats.org/markup-compatibility/2006">
-        <mc:Choice xmlns:a14="http://schemas.microsoft.com/office/drawing/2010/main" Requires="a14">
+      <mc:AlternateContent xmlns:mc="http://schemas.openxmlformats.org/markup-compatibility/2006" xmlns:a14="http://schemas.microsoft.com/office/drawing/2010/main">
+        <mc:Choice Requires="a14">
           <p:sp>
             <p:nvSpPr>
               <p:cNvPr id="7" name="TextBox 6"/>
@@ -11526,6 +11515,7 @@
               </a:bodyPr>
               <a:lstStyle/>
               <a:p>
+                <a:pPr/>
                 <a14:m>
                   <m:oMathPara xmlns:m="http://schemas.openxmlformats.org/officeDocument/2006/math">
                     <m:oMathParaPr>
@@ -11701,7 +11691,7 @@
             </p:txBody>
           </p:sp>
         </mc:Choice>
-        <mc:Fallback>
+        <mc:Fallback xmlns="">
           <p:sp>
             <p:nvSpPr>
               <p:cNvPr id="7" name="TextBox 6"/>

</xml_diff>